<commit_message>
files updated to include likelihood profile work for Apr 8 2015
</commit_message>
<xml_diff>
--- a/Estimation.pptx
+++ b/Estimation.pptx
@@ -35,6 +35,17 @@
     <p:sldId id="283" r:id="rId29"/>
     <p:sldId id="284" r:id="rId30"/>
     <p:sldId id="285" r:id="rId31"/>
+    <p:sldId id="288" r:id="rId32"/>
+    <p:sldId id="289" r:id="rId33"/>
+    <p:sldId id="290" r:id="rId34"/>
+    <p:sldId id="293" r:id="rId35"/>
+    <p:sldId id="295" r:id="rId36"/>
+    <p:sldId id="296" r:id="rId37"/>
+    <p:sldId id="301" r:id="rId38"/>
+    <p:sldId id="297" r:id="rId39"/>
+    <p:sldId id="298" r:id="rId40"/>
+    <p:sldId id="299" r:id="rId41"/>
+    <p:sldId id="300" r:id="rId42"/>
   </p:sldIdLst>
   <p:sldSz cx="9144000" cy="6858000" type="screen4x3"/>
   <p:notesSz cx="6858000" cy="9144000"/>
@@ -317,7 +328,7 @@
           <a:p>
             <a:fld id="{A3B7DA37-184F-FD47-81CD-18B9F4699F45}" type="datetimeFigureOut">
               <a:rPr lang="en-US" smtClean="0"/>
-              <a:t>3/25/15</a:t>
+              <a:t>4/7/15</a:t>
             </a:fld>
             <a:endParaRPr lang="en-US"/>
           </a:p>
@@ -487,7 +498,7 @@
           <a:p>
             <a:fld id="{A3B7DA37-184F-FD47-81CD-18B9F4699F45}" type="datetimeFigureOut">
               <a:rPr lang="en-US" smtClean="0"/>
-              <a:t>3/25/15</a:t>
+              <a:t>4/7/15</a:t>
             </a:fld>
             <a:endParaRPr lang="en-US"/>
           </a:p>
@@ -667,7 +678,7 @@
           <a:p>
             <a:fld id="{A3B7DA37-184F-FD47-81CD-18B9F4699F45}" type="datetimeFigureOut">
               <a:rPr lang="en-US" smtClean="0"/>
-              <a:t>3/25/15</a:t>
+              <a:t>4/7/15</a:t>
             </a:fld>
             <a:endParaRPr lang="en-US"/>
           </a:p>
@@ -1530,7 +1541,7 @@
           <a:p>
             <a:fld id="{A3B7DA37-184F-FD47-81CD-18B9F4699F45}" type="datetimeFigureOut">
               <a:rPr lang="en-US" smtClean="0"/>
-              <a:t>3/25/15</a:t>
+              <a:t>4/7/15</a:t>
             </a:fld>
             <a:endParaRPr lang="en-US"/>
           </a:p>
@@ -1776,7 +1787,7 @@
           <a:p>
             <a:fld id="{A3B7DA37-184F-FD47-81CD-18B9F4699F45}" type="datetimeFigureOut">
               <a:rPr lang="en-US" smtClean="0"/>
-              <a:t>3/25/15</a:t>
+              <a:t>4/7/15</a:t>
             </a:fld>
             <a:endParaRPr lang="en-US"/>
           </a:p>
@@ -2064,7 +2075,7 @@
           <a:p>
             <a:fld id="{A3B7DA37-184F-FD47-81CD-18B9F4699F45}" type="datetimeFigureOut">
               <a:rPr lang="en-US" smtClean="0"/>
-              <a:t>3/25/15</a:t>
+              <a:t>4/7/15</a:t>
             </a:fld>
             <a:endParaRPr lang="en-US"/>
           </a:p>
@@ -2486,7 +2497,7 @@
           <a:p>
             <a:fld id="{A3B7DA37-184F-FD47-81CD-18B9F4699F45}" type="datetimeFigureOut">
               <a:rPr lang="en-US" smtClean="0"/>
-              <a:t>3/25/15</a:t>
+              <a:t>4/7/15</a:t>
             </a:fld>
             <a:endParaRPr lang="en-US"/>
           </a:p>
@@ -2604,7 +2615,7 @@
           <a:p>
             <a:fld id="{A3B7DA37-184F-FD47-81CD-18B9F4699F45}" type="datetimeFigureOut">
               <a:rPr lang="en-US" smtClean="0"/>
-              <a:t>3/25/15</a:t>
+              <a:t>4/7/15</a:t>
             </a:fld>
             <a:endParaRPr lang="en-US"/>
           </a:p>
@@ -2699,7 +2710,7 @@
           <a:p>
             <a:fld id="{A3B7DA37-184F-FD47-81CD-18B9F4699F45}" type="datetimeFigureOut">
               <a:rPr lang="en-US" smtClean="0"/>
-              <a:t>3/25/15</a:t>
+              <a:t>4/7/15</a:t>
             </a:fld>
             <a:endParaRPr lang="en-US"/>
           </a:p>
@@ -2976,7 +2987,7 @@
           <a:p>
             <a:fld id="{A3B7DA37-184F-FD47-81CD-18B9F4699F45}" type="datetimeFigureOut">
               <a:rPr lang="en-US" smtClean="0"/>
-              <a:t>3/25/15</a:t>
+              <a:t>4/7/15</a:t>
             </a:fld>
             <a:endParaRPr lang="en-US"/>
           </a:p>
@@ -3229,7 +3240,7 @@
           <a:p>
             <a:fld id="{A3B7DA37-184F-FD47-81CD-18B9F4699F45}" type="datetimeFigureOut">
               <a:rPr lang="en-US" smtClean="0"/>
-              <a:t>3/25/15</a:t>
+              <a:t>4/7/15</a:t>
             </a:fld>
             <a:endParaRPr lang="en-US"/>
           </a:p>
@@ -3442,7 +3453,7 @@
           <a:p>
             <a:fld id="{A3B7DA37-184F-FD47-81CD-18B9F4699F45}" type="datetimeFigureOut">
               <a:rPr lang="en-US" smtClean="0"/>
-              <a:t>3/25/15</a:t>
+              <a:t>4/7/15</a:t>
             </a:fld>
             <a:endParaRPr lang="en-US"/>
           </a:p>
@@ -3875,11 +3886,7 @@
           <a:p>
             <a:r>
               <a:rPr lang="en-US" dirty="0" smtClean="0"/>
-              <a:t>Acknowledgements: Andr</a:t>
-            </a:r>
-            <a:r>
-              <a:rPr lang="en-US" dirty="0" smtClean="0"/>
-              <a:t>é Punt</a:t>
+              <a:t>Acknowledgements: André Punt</a:t>
             </a:r>
             <a:endParaRPr lang="en-US" dirty="0"/>
           </a:p>
@@ -5103,7 +5110,7 @@
           <a:graphicData uri="http://schemas.openxmlformats.org/presentationml/2006/ole">
             <mc:AlternateContent xmlns:mc="http://schemas.openxmlformats.org/markup-compatibility/2006">
               <mc:Choice xmlns:v="urn:schemas-microsoft-com:vml" Requires="v">
-                <p:oleObj spid="_x0000_s12326" name="Equation" r:id="rId3" imgW="2044440" imgH="215640" progId="Equation.DSMT4">
+                <p:oleObj spid="_x0000_s12339" name="Equation" r:id="rId3" imgW="2044440" imgH="215640" progId="Equation.DSMT4">
                   <p:embed/>
                 </p:oleObj>
               </mc:Choice>
@@ -5175,7 +5182,7 @@
           <a:graphicData uri="http://schemas.openxmlformats.org/presentationml/2006/ole">
             <mc:AlternateContent xmlns:mc="http://schemas.openxmlformats.org/markup-compatibility/2006">
               <mc:Choice xmlns:v="urn:schemas-microsoft-com:vml" Requires="v">
-                <p:oleObj spid="_x0000_s12327" name="Equation" r:id="rId5" imgW="1168200" imgH="228600" progId="Equation.3">
+                <p:oleObj spid="_x0000_s12340" name="Equation" r:id="rId5" imgW="1168200" imgH="228600" progId="Equation.3">
                   <p:embed/>
                 </p:oleObj>
               </mc:Choice>
@@ -5360,7 +5367,7 @@
           <a:graphicData uri="http://schemas.openxmlformats.org/presentationml/2006/ole">
             <mc:AlternateContent xmlns:mc="http://schemas.openxmlformats.org/markup-compatibility/2006">
               <mc:Choice xmlns:v="urn:schemas-microsoft-com:vml" Requires="v">
-                <p:oleObj spid="_x0000_s13352" name="Equation" r:id="rId3" imgW="2057400" imgH="228600" progId="Equation.DSMT4">
+                <p:oleObj spid="_x0000_s13365" name="Equation" r:id="rId3" imgW="2057400" imgH="228600" progId="Equation.DSMT4">
                   <p:embed/>
                 </p:oleObj>
               </mc:Choice>
@@ -5455,7 +5462,7 @@
           <a:graphicData uri="http://schemas.openxmlformats.org/presentationml/2006/ole">
             <mc:AlternateContent xmlns:mc="http://schemas.openxmlformats.org/markup-compatibility/2006">
               <mc:Choice xmlns:v="urn:schemas-microsoft-com:vml" Requires="v">
-                <p:oleObj spid="_x0000_s13353" name="Equation" r:id="rId5" imgW="1523880" imgH="495000" progId="Equation.3">
+                <p:oleObj spid="_x0000_s13366" name="Equation" r:id="rId5" imgW="1523880" imgH="495000" progId="Equation.3">
                   <p:embed/>
                 </p:oleObj>
               </mc:Choice>
@@ -6155,7 +6162,7 @@
           <a:graphicData uri="http://schemas.openxmlformats.org/presentationml/2006/ole">
             <mc:AlternateContent xmlns:mc="http://schemas.openxmlformats.org/markup-compatibility/2006">
               <mc:Choice xmlns:v="urn:schemas-microsoft-com:vml" Requires="v">
-                <p:oleObj spid="_x0000_s15400" name="Equation" r:id="rId3" imgW="2286000" imgH="241200" progId="Equation.DSMT4">
+                <p:oleObj spid="_x0000_s15413" name="Equation" r:id="rId3" imgW="2286000" imgH="241200" progId="Equation.DSMT4">
                   <p:embed/>
                 </p:oleObj>
               </mc:Choice>
@@ -6256,7 +6263,7 @@
           <a:graphicData uri="http://schemas.openxmlformats.org/presentationml/2006/ole">
             <mc:AlternateContent xmlns:mc="http://schemas.openxmlformats.org/markup-compatibility/2006">
               <mc:Choice xmlns:v="urn:schemas-microsoft-com:vml" Requires="v">
-                <p:oleObj spid="_x0000_s15401" name="Equation" r:id="rId5" imgW="2831760" imgH="241200" progId="Equation.3">
+                <p:oleObj spid="_x0000_s15414" name="Equation" r:id="rId5" imgW="2831760" imgH="241200" progId="Equation.3">
                   <p:embed/>
                 </p:oleObj>
               </mc:Choice>
@@ -6717,7 +6724,7 @@
           <a:graphicData uri="http://schemas.openxmlformats.org/presentationml/2006/ole">
             <mc:AlternateContent xmlns:mc="http://schemas.openxmlformats.org/markup-compatibility/2006">
               <mc:Choice xmlns:v="urn:schemas-microsoft-com:vml" Requires="v">
-                <p:oleObj spid="_x0000_s17429" name="Equation" r:id="rId5" imgW="1523880" imgH="495000" progId="Equation.3">
+                <p:oleObj spid="_x0000_s17436" name="Equation" r:id="rId5" imgW="1523880" imgH="495000" progId="Equation.3">
                   <p:embed/>
                 </p:oleObj>
               </mc:Choice>
@@ -7574,7 +7581,7 @@
           <a:graphicData uri="http://schemas.openxmlformats.org/presentationml/2006/ole">
             <mc:AlternateContent xmlns:mc="http://schemas.openxmlformats.org/markup-compatibility/2006">
               <mc:Choice xmlns:v="urn:schemas-microsoft-com:vml" Requires="v">
-                <p:oleObj spid="_x0000_s19496" name="Equation" r:id="rId3" imgW="5448240" imgH="507960" progId="Equation.DSMT4">
+                <p:oleObj spid="_x0000_s19509" name="Equation" r:id="rId3" imgW="5448240" imgH="507960" progId="Equation.DSMT4">
                   <p:embed/>
                 </p:oleObj>
               </mc:Choice>
@@ -7675,7 +7682,7 @@
           <a:graphicData uri="http://schemas.openxmlformats.org/presentationml/2006/ole">
             <mc:AlternateContent xmlns:mc="http://schemas.openxmlformats.org/markup-compatibility/2006">
               <mc:Choice xmlns:v="urn:schemas-microsoft-com:vml" Requires="v">
-                <p:oleObj spid="_x0000_s19497" name="Equation" r:id="rId5" imgW="571320" imgH="444240" progId="Equation.3">
+                <p:oleObj spid="_x0000_s19510" name="Equation" r:id="rId5" imgW="571320" imgH="444240" progId="Equation.3">
                   <p:embed/>
                 </p:oleObj>
               </mc:Choice>
@@ -7908,7 +7915,7 @@
           <a:graphicData uri="http://schemas.openxmlformats.org/presentationml/2006/ole">
             <mc:AlternateContent xmlns:mc="http://schemas.openxmlformats.org/markup-compatibility/2006">
               <mc:Choice xmlns:v="urn:schemas-microsoft-com:vml" Requires="v">
-                <p:oleObj spid="_x0000_s20556" name="Equation" r:id="rId3" imgW="711000" imgH="228600" progId="Equation.DSMT4">
+                <p:oleObj spid="_x0000_s20581" name="Equation" r:id="rId3" imgW="711000" imgH="228600" progId="Equation.DSMT4">
                   <p:embed/>
                 </p:oleObj>
               </mc:Choice>
@@ -8010,7 +8017,7 @@
           <a:graphicData uri="http://schemas.openxmlformats.org/presentationml/2006/ole">
             <mc:AlternateContent xmlns:mc="http://schemas.openxmlformats.org/markup-compatibility/2006">
               <mc:Choice xmlns:v="urn:schemas-microsoft-com:vml" Requires="v">
-                <p:oleObj spid="_x0000_s20557" name="Equation" r:id="rId5" imgW="1828800" imgH="241200" progId="Equation.DSMT4">
+                <p:oleObj spid="_x0000_s20582" name="Equation" r:id="rId5" imgW="1828800" imgH="241200" progId="Equation.DSMT4">
                   <p:embed/>
                 </p:oleObj>
               </mc:Choice>
@@ -8083,7 +8090,7 @@
           <a:graphicData uri="http://schemas.openxmlformats.org/presentationml/2006/ole">
             <mc:AlternateContent xmlns:mc="http://schemas.openxmlformats.org/markup-compatibility/2006">
               <mc:Choice xmlns:v="urn:schemas-microsoft-com:vml" Requires="v">
-                <p:oleObj spid="_x0000_s20558" name="Equation" r:id="rId7" imgW="1549080" imgH="482400" progId="Equation.DSMT4">
+                <p:oleObj spid="_x0000_s20583" name="Equation" r:id="rId7" imgW="1549080" imgH="482400" progId="Equation.DSMT4">
                   <p:embed/>
                 </p:oleObj>
               </mc:Choice>
@@ -8396,7 +8403,7 @@
           <a:graphicData uri="http://schemas.openxmlformats.org/presentationml/2006/ole">
             <mc:AlternateContent xmlns:mc="http://schemas.openxmlformats.org/markup-compatibility/2006">
               <mc:Choice xmlns:v="urn:schemas-microsoft-com:vml" Requires="v">
-                <p:oleObj spid="_x0000_s20559" name="Equation" r:id="rId9" imgW="2197080" imgH="342720" progId="Equation.3">
+                <p:oleObj spid="_x0000_s20584" name="Equation" r:id="rId9" imgW="2197080" imgH="342720" progId="Equation.3">
                   <p:embed/>
                 </p:oleObj>
               </mc:Choice>
@@ -8642,7 +8649,7 @@
           <a:graphicData uri="http://schemas.openxmlformats.org/presentationml/2006/ole">
             <mc:AlternateContent xmlns:mc="http://schemas.openxmlformats.org/markup-compatibility/2006">
               <mc:Choice xmlns:v="urn:schemas-microsoft-com:vml" Requires="v">
-                <p:oleObj spid="_x0000_s24598" name="Equation" r:id="rId3" imgW="2819160" imgH="533160" progId="Equation.3">
+                <p:oleObj spid="_x0000_s24605" name="Equation" r:id="rId3" imgW="2819160" imgH="533160" progId="Equation.3">
                   <p:embed/>
                 </p:oleObj>
               </mc:Choice>
@@ -9071,7 +9078,7 @@
           <a:graphicData uri="http://schemas.openxmlformats.org/presentationml/2006/ole">
             <mc:AlternateContent xmlns:mc="http://schemas.openxmlformats.org/markup-compatibility/2006">
               <mc:Choice xmlns:v="urn:schemas-microsoft-com:vml" Requires="v">
-                <p:oleObj spid="_x0000_s22566" name="Equation" r:id="rId3" imgW="4953000" imgH="457200" progId="Equation.3">
+                <p:oleObj spid="_x0000_s22579" name="Equation" r:id="rId3" imgW="4953000" imgH="457200" progId="Equation.3">
                   <p:embed/>
                 </p:oleObj>
               </mc:Choice>
@@ -9166,7 +9173,7 @@
           <a:graphicData uri="http://schemas.openxmlformats.org/presentationml/2006/ole">
             <mc:AlternateContent xmlns:mc="http://schemas.openxmlformats.org/markup-compatibility/2006">
               <mc:Choice xmlns:v="urn:schemas-microsoft-com:vml" Requires="v">
-                <p:oleObj spid="_x0000_s22567" name="Equation" r:id="rId5" imgW="1752600" imgH="406400" progId="Equation.3">
+                <p:oleObj spid="_x0000_s22580" name="Equation" r:id="rId5" imgW="1752600" imgH="406400" progId="Equation.3">
                   <p:embed/>
                 </p:oleObj>
               </mc:Choice>
@@ -9299,7 +9306,7 @@
           <a:graphicData uri="http://schemas.openxmlformats.org/presentationml/2006/ole">
             <mc:AlternateContent xmlns:mc="http://schemas.openxmlformats.org/markup-compatibility/2006">
               <mc:Choice xmlns:v="urn:schemas-microsoft-com:vml" Requires="v">
-                <p:oleObj spid="_x0000_s25621" name="Equation" r:id="rId3" imgW="2946400" imgH="1409700" progId="Equation.3">
+                <p:oleObj spid="_x0000_s25628" name="Equation" r:id="rId3" imgW="2946400" imgH="1409700" progId="Equation.3">
                   <p:embed/>
                 </p:oleObj>
               </mc:Choice>
@@ -9575,7 +9582,7 @@
           <a:graphicData uri="http://schemas.openxmlformats.org/presentationml/2006/ole">
             <mc:AlternateContent xmlns:mc="http://schemas.openxmlformats.org/markup-compatibility/2006">
               <mc:Choice xmlns:v="urn:schemas-microsoft-com:vml" Requires="v">
-                <p:oleObj spid="_x0000_s26664" name="Equation" r:id="rId3" imgW="1612900" imgH="1168400" progId="Equation.3">
+                <p:oleObj spid="_x0000_s26677" name="Equation" r:id="rId3" imgW="1612900" imgH="1168400" progId="Equation.3">
                   <p:embed/>
                 </p:oleObj>
               </mc:Choice>
@@ -9736,7 +9743,7 @@
           <a:graphicData uri="http://schemas.openxmlformats.org/presentationml/2006/ole">
             <mc:AlternateContent xmlns:mc="http://schemas.openxmlformats.org/markup-compatibility/2006">
               <mc:Choice xmlns:v="urn:schemas-microsoft-com:vml" Requires="v">
-                <p:oleObj spid="_x0000_s26665" name="Equation" r:id="rId5" imgW="152400" imgH="139700" progId="Equation.3">
+                <p:oleObj spid="_x0000_s26678" name="Equation" r:id="rId5" imgW="152400" imgH="139700" progId="Equation.3">
                   <p:embed/>
                 </p:oleObj>
               </mc:Choice>
@@ -11537,6 +11544,1568 @@
 </p:sld>
 </file>
 
+<file path=ppt/slides/slide31.xml><?xml version="1.0" encoding="utf-8"?>
+<p:sld xmlns:a="http://schemas.openxmlformats.org/drawingml/2006/main" xmlns:r="http://schemas.openxmlformats.org/officeDocument/2006/relationships" xmlns:p="http://schemas.openxmlformats.org/presentationml/2006/main">
+  <p:cSld>
+    <p:spTree>
+      <p:nvGrpSpPr>
+        <p:cNvPr id="1" name=""/>
+        <p:cNvGrpSpPr/>
+        <p:nvPr/>
+      </p:nvGrpSpPr>
+      <p:grpSpPr>
+        <a:xfrm>
+          <a:off x="0" y="0"/>
+          <a:ext cx="0" cy="0"/>
+          <a:chOff x="0" y="0"/>
+          <a:chExt cx="0" cy="0"/>
+        </a:xfrm>
+      </p:grpSpPr>
+      <p:sp>
+        <p:nvSpPr>
+          <p:cNvPr id="325634" name="Rectangle 1026"/>
+          <p:cNvSpPr>
+            <a:spLocks noGrp="1" noChangeArrowheads="1"/>
+          </p:cNvSpPr>
+          <p:nvPr>
+            <p:ph type="title"/>
+          </p:nvPr>
+        </p:nvSpPr>
+        <p:spPr/>
+        <p:txBody>
+          <a:bodyPr>
+            <a:normAutofit fontScale="90000"/>
+          </a:bodyPr>
+          <a:lstStyle/>
+          <a:p>
+            <a:pPr algn="ctr"/>
+            <a:r>
+              <a:rPr lang="en-US" sz="4000"/>
+              <a:t>Quantifying Uncertainty</a:t>
+            </a:r>
+            <a:br>
+              <a:rPr lang="en-US" sz="4000"/>
+            </a:br>
+            <a:r>
+              <a:rPr lang="en-US" sz="4000"/>
+              <a:t>(an overview)</a:t>
+            </a:r>
+          </a:p>
+        </p:txBody>
+      </p:sp>
+      <p:sp>
+        <p:nvSpPr>
+          <p:cNvPr id="325635" name="Rectangle 1027"/>
+          <p:cNvSpPr>
+            <a:spLocks noGrp="1" noChangeArrowheads="1"/>
+          </p:cNvSpPr>
+          <p:nvPr>
+            <p:ph type="body" idx="1"/>
+          </p:nvPr>
+        </p:nvSpPr>
+        <p:spPr>
+          <a:xfrm>
+            <a:off x="1182688" y="1828800"/>
+            <a:ext cx="7808912" cy="4724400"/>
+          </a:xfrm>
+        </p:spPr>
+        <p:txBody>
+          <a:bodyPr/>
+          <a:lstStyle/>
+          <a:p>
+            <a:r>
+              <a:rPr lang="en-US" sz="2800"/>
+              <a:t>Uncertainty comes in several forms:</a:t>
+            </a:r>
+          </a:p>
+          <a:p>
+            <a:pPr lvl="1"/>
+            <a:r>
+              <a:rPr lang="en-US" sz="2200"/>
+              <a:t>Process uncertainty (e.g. recruitment variability, natural mortality variability, birth-death processes).</a:t>
+            </a:r>
+          </a:p>
+          <a:p>
+            <a:pPr lvl="1"/>
+            <a:r>
+              <a:rPr lang="en-US" sz="2200"/>
+              <a:t>Observation uncertainty (e.g. CVs for abundance estimates).</a:t>
+            </a:r>
+          </a:p>
+          <a:p>
+            <a:pPr lvl="1"/>
+            <a:r>
+              <a:rPr lang="en-US" sz="2200"/>
+              <a:t>Model uncertainty (is the model we chose correct; how many alternative models fit the data adequately?)</a:t>
+            </a:r>
+          </a:p>
+          <a:p>
+            <a:pPr lvl="1"/>
+            <a:r>
+              <a:rPr lang="en-US" sz="2200"/>
+              <a:t>Estimation uncertainty – given a model and some data, how well do the data determine the parameters (and predictions) of the model.</a:t>
+            </a:r>
+          </a:p>
+          <a:p>
+            <a:pPr lvl="1"/>
+            <a:r>
+              <a:rPr lang="en-US" sz="2200"/>
+              <a:t>Implementation uncertainty – given a management decision, it be enforced?</a:t>
+            </a:r>
+          </a:p>
+        </p:txBody>
+      </p:sp>
+    </p:spTree>
+    <p:extLst>
+      <p:ext uri="{BB962C8B-B14F-4D97-AF65-F5344CB8AC3E}">
+        <p14:creationId xmlns:p14="http://schemas.microsoft.com/office/powerpoint/2010/main" val="2602646999"/>
+      </p:ext>
+    </p:extLst>
+  </p:cSld>
+  <p:clrMapOvr>
+    <a:masterClrMapping/>
+  </p:clrMapOvr>
+</p:sld>
+</file>
+
+<file path=ppt/slides/slide32.xml><?xml version="1.0" encoding="utf-8"?>
+<p:sld xmlns:a="http://schemas.openxmlformats.org/drawingml/2006/main" xmlns:r="http://schemas.openxmlformats.org/officeDocument/2006/relationships" xmlns:p="http://schemas.openxmlformats.org/presentationml/2006/main">
+  <p:cSld>
+    <p:spTree>
+      <p:nvGrpSpPr>
+        <p:cNvPr id="1" name=""/>
+        <p:cNvGrpSpPr/>
+        <p:nvPr/>
+      </p:nvGrpSpPr>
+      <p:grpSpPr>
+        <a:xfrm>
+          <a:off x="0" y="0"/>
+          <a:ext cx="0" cy="0"/>
+          <a:chOff x="0" y="0"/>
+          <a:chExt cx="0" cy="0"/>
+        </a:xfrm>
+      </p:grpSpPr>
+      <p:sp>
+        <p:nvSpPr>
+          <p:cNvPr id="359426" name="Rectangle 2"/>
+          <p:cNvSpPr>
+            <a:spLocks noGrp="1" noChangeArrowheads="1"/>
+          </p:cNvSpPr>
+          <p:nvPr>
+            <p:ph type="title"/>
+          </p:nvPr>
+        </p:nvSpPr>
+        <p:spPr/>
+        <p:txBody>
+          <a:bodyPr>
+            <a:normAutofit fontScale="90000"/>
+          </a:bodyPr>
+          <a:lstStyle/>
+          <a:p>
+            <a:pPr algn="ctr"/>
+            <a:r>
+              <a:rPr lang="en-US" sz="4000"/>
+              <a:t>Quantifying Uncertainty</a:t>
+            </a:r>
+            <a:br>
+              <a:rPr lang="en-US" sz="4000"/>
+            </a:br>
+            <a:r>
+              <a:rPr lang="en-US" sz="4000"/>
+              <a:t>(an overview-II)</a:t>
+            </a:r>
+          </a:p>
+        </p:txBody>
+      </p:sp>
+      <p:sp>
+        <p:nvSpPr>
+          <p:cNvPr id="359427" name="Rectangle 3"/>
+          <p:cNvSpPr>
+            <a:spLocks noGrp="1" noChangeArrowheads="1"/>
+          </p:cNvSpPr>
+          <p:nvPr>
+            <p:ph type="body" idx="1"/>
+          </p:nvPr>
+        </p:nvSpPr>
+        <p:spPr/>
+        <p:txBody>
+          <a:bodyPr/>
+          <a:lstStyle/>
+          <a:p>
+            <a:pPr>
+              <a:lnSpc>
+                <a:spcPct val="90000"/>
+              </a:lnSpc>
+            </a:pPr>
+            <a:r>
+              <a:rPr lang="en-US"/>
+              <a:t>The various types of uncertainties can be distinguished by:</a:t>
+            </a:r>
+          </a:p>
+          <a:p>
+            <a:pPr lvl="1">
+              <a:lnSpc>
+                <a:spcPct val="90000"/>
+              </a:lnSpc>
+            </a:pPr>
+            <a:r>
+              <a:rPr lang="en-US"/>
+              <a:t>Can they be reduced by additional research or are they inherent to the system.</a:t>
+            </a:r>
+          </a:p>
+          <a:p>
+            <a:pPr lvl="1">
+              <a:lnSpc>
+                <a:spcPct val="90000"/>
+              </a:lnSpc>
+            </a:pPr>
+            <a:r>
+              <a:rPr lang="en-US"/>
+              <a:t>Can we quantify them using classical statistical methods.</a:t>
+            </a:r>
+          </a:p>
+          <a:p>
+            <a:pPr>
+              <a:lnSpc>
+                <a:spcPct val="90000"/>
+              </a:lnSpc>
+            </a:pPr>
+            <a:r>
+              <a:rPr lang="en-US"/>
+              <a:t>Today we address “estimation uncertainty”. We defer the other types of uncertainties to future lectures.</a:t>
+            </a:r>
+          </a:p>
+        </p:txBody>
+      </p:sp>
+    </p:spTree>
+    <p:extLst>
+      <p:ext uri="{BB962C8B-B14F-4D97-AF65-F5344CB8AC3E}">
+        <p14:creationId xmlns:p14="http://schemas.microsoft.com/office/powerpoint/2010/main" val="2130924440"/>
+      </p:ext>
+    </p:extLst>
+  </p:cSld>
+  <p:clrMapOvr>
+    <a:masterClrMapping/>
+  </p:clrMapOvr>
+</p:sld>
+</file>
+
+<file path=ppt/slides/slide33.xml><?xml version="1.0" encoding="utf-8"?>
+<p:sld xmlns:a="http://schemas.openxmlformats.org/drawingml/2006/main" xmlns:r="http://schemas.openxmlformats.org/officeDocument/2006/relationships" xmlns:p="http://schemas.openxmlformats.org/presentationml/2006/main">
+  <p:cSld>
+    <p:spTree>
+      <p:nvGrpSpPr>
+        <p:cNvPr id="1" name=""/>
+        <p:cNvGrpSpPr/>
+        <p:nvPr/>
+      </p:nvGrpSpPr>
+      <p:grpSpPr>
+        <a:xfrm>
+          <a:off x="0" y="0"/>
+          <a:ext cx="0" cy="0"/>
+          <a:chOff x="0" y="0"/>
+          <a:chExt cx="0" cy="0"/>
+        </a:xfrm>
+      </p:grpSpPr>
+      <p:sp>
+        <p:nvSpPr>
+          <p:cNvPr id="361474" name="Rectangle 2"/>
+          <p:cNvSpPr>
+            <a:spLocks noGrp="1" noChangeArrowheads="1"/>
+          </p:cNvSpPr>
+          <p:nvPr>
+            <p:ph type="title"/>
+          </p:nvPr>
+        </p:nvSpPr>
+        <p:spPr/>
+        <p:txBody>
+          <a:bodyPr/>
+          <a:lstStyle/>
+          <a:p>
+            <a:pPr algn="ctr"/>
+            <a:r>
+              <a:rPr lang="en-US"/>
+              <a:t>Estimation Uncertainty</a:t>
+            </a:r>
+          </a:p>
+        </p:txBody>
+      </p:sp>
+      <p:sp>
+        <p:nvSpPr>
+          <p:cNvPr id="361475" name="Rectangle 3"/>
+          <p:cNvSpPr>
+            <a:spLocks noGrp="1" noChangeArrowheads="1"/>
+          </p:cNvSpPr>
+          <p:nvPr>
+            <p:ph type="body" idx="1"/>
+          </p:nvPr>
+        </p:nvSpPr>
+        <p:spPr/>
+        <p:txBody>
+          <a:bodyPr/>
+          <a:lstStyle/>
+          <a:p>
+            <a:r>
+              <a:rPr lang="en-US"/>
+              <a:t>We are going to quantify uncertainty about the estimates of the model parameters (and its predictions of state variables) under the assumption that the model (and likelihood) are correct.</a:t>
+            </a:r>
+          </a:p>
+          <a:p>
+            <a:r>
+              <a:rPr lang="en-US"/>
+              <a:t>Typical ways to quantify estimation uncertainty include computing standard errors and confidence intervals.</a:t>
+            </a:r>
+          </a:p>
+        </p:txBody>
+      </p:sp>
+    </p:spTree>
+    <p:extLst>
+      <p:ext uri="{BB962C8B-B14F-4D97-AF65-F5344CB8AC3E}">
+        <p14:creationId xmlns:p14="http://schemas.microsoft.com/office/powerpoint/2010/main" val="403231847"/>
+      </p:ext>
+    </p:extLst>
+  </p:cSld>
+  <p:clrMapOvr>
+    <a:masterClrMapping/>
+  </p:clrMapOvr>
+</p:sld>
+</file>
+
+<file path=ppt/slides/slide34.xml><?xml version="1.0" encoding="utf-8"?>
+<p:sld xmlns:a="http://schemas.openxmlformats.org/drawingml/2006/main" xmlns:r="http://schemas.openxmlformats.org/officeDocument/2006/relationships" xmlns:p="http://schemas.openxmlformats.org/presentationml/2006/main">
+  <p:cSld>
+    <p:spTree>
+      <p:nvGrpSpPr>
+        <p:cNvPr id="1" name=""/>
+        <p:cNvGrpSpPr/>
+        <p:nvPr/>
+      </p:nvGrpSpPr>
+      <p:grpSpPr>
+        <a:xfrm>
+          <a:off x="0" y="0"/>
+          <a:ext cx="0" cy="0"/>
+          <a:chOff x="0" y="0"/>
+          <a:chExt cx="0" cy="0"/>
+        </a:xfrm>
+      </p:grpSpPr>
+      <p:sp>
+        <p:nvSpPr>
+          <p:cNvPr id="365570" name="Rectangle 2"/>
+          <p:cNvSpPr>
+            <a:spLocks noGrp="1" noChangeArrowheads="1"/>
+          </p:cNvSpPr>
+          <p:nvPr>
+            <p:ph type="title"/>
+          </p:nvPr>
+        </p:nvSpPr>
+        <p:spPr/>
+        <p:txBody>
+          <a:bodyPr>
+            <a:normAutofit fontScale="90000"/>
+          </a:bodyPr>
+          <a:lstStyle/>
+          <a:p>
+            <a:pPr algn="ctr"/>
+            <a:r>
+              <a:rPr lang="en-US"/>
+              <a:t>Likelihood Profile </a:t>
+            </a:r>
+            <a:br>
+              <a:rPr lang="en-US"/>
+            </a:br>
+            <a:r>
+              <a:rPr lang="en-US"/>
+              <a:t>(one parameter)</a:t>
+            </a:r>
+          </a:p>
+        </p:txBody>
+      </p:sp>
+      <p:sp>
+        <p:nvSpPr>
+          <p:cNvPr id="365571" name="Rectangle 3"/>
+          <p:cNvSpPr>
+            <a:spLocks noGrp="1" noChangeArrowheads="1"/>
+          </p:cNvSpPr>
+          <p:nvPr>
+            <p:ph type="body" idx="1"/>
+          </p:nvPr>
+        </p:nvSpPr>
+        <p:spPr/>
+        <p:txBody>
+          <a:bodyPr/>
+          <a:lstStyle/>
+          <a:p>
+            <a:pPr marL="609600" indent="-609600">
+              <a:lnSpc>
+                <a:spcPct val="90000"/>
+              </a:lnSpc>
+              <a:buFont typeface="Wingdings" charset="0"/>
+              <a:buAutoNum type="arabicPeriod"/>
+            </a:pPr>
+            <a:r>
+              <a:rPr lang="en-US" sz="2800"/>
+              <a:t>Fit the model to find the ML parameter estimates and the corresponding negative log-likelihood.</a:t>
+            </a:r>
+          </a:p>
+          <a:p>
+            <a:pPr marL="609600" indent="-609600">
+              <a:lnSpc>
+                <a:spcPct val="90000"/>
+              </a:lnSpc>
+              <a:buFont typeface="Wingdings" charset="0"/>
+              <a:buAutoNum type="arabicPeriod"/>
+            </a:pPr>
+            <a:r>
+              <a:rPr lang="en-US" sz="2800"/>
+              <a:t>Select a set of fixed values for the parameter of interest.</a:t>
+            </a:r>
+          </a:p>
+          <a:p>
+            <a:pPr marL="609600" indent="-609600">
+              <a:lnSpc>
+                <a:spcPct val="90000"/>
+              </a:lnSpc>
+              <a:buFont typeface="Wingdings" charset="0"/>
+              <a:buAutoNum type="arabicPeriod"/>
+            </a:pPr>
+            <a:r>
+              <a:rPr lang="en-US" sz="2800"/>
+              <a:t>Minimize the negative log-likelihood fixing the parameter to each value in turn.</a:t>
+            </a:r>
+          </a:p>
+          <a:p>
+            <a:pPr marL="609600" indent="-609600">
+              <a:lnSpc>
+                <a:spcPct val="90000"/>
+              </a:lnSpc>
+              <a:buFont typeface="Wingdings" charset="0"/>
+              <a:buAutoNum type="arabicPeriod"/>
+            </a:pPr>
+            <a:r>
+              <a:rPr lang="en-US" sz="2800"/>
+              <a:t>Plot the difference between the negative log-likelihood from step 1 and those from step 3.</a:t>
+            </a:r>
+          </a:p>
+        </p:txBody>
+      </p:sp>
+    </p:spTree>
+    <p:extLst>
+      <p:ext uri="{BB962C8B-B14F-4D97-AF65-F5344CB8AC3E}">
+        <p14:creationId xmlns:p14="http://schemas.microsoft.com/office/powerpoint/2010/main" val="1319183829"/>
+      </p:ext>
+    </p:extLst>
+  </p:cSld>
+  <p:clrMapOvr>
+    <a:masterClrMapping/>
+  </p:clrMapOvr>
+</p:sld>
+</file>
+
+<file path=ppt/slides/slide35.xml><?xml version="1.0" encoding="utf-8"?>
+<p:sld xmlns:a="http://schemas.openxmlformats.org/drawingml/2006/main" xmlns:r="http://schemas.openxmlformats.org/officeDocument/2006/relationships" xmlns:p="http://schemas.openxmlformats.org/presentationml/2006/main">
+  <p:cSld>
+    <p:spTree>
+      <p:nvGrpSpPr>
+        <p:cNvPr id="1" name=""/>
+        <p:cNvGrpSpPr/>
+        <p:nvPr/>
+      </p:nvGrpSpPr>
+      <p:grpSpPr>
+        <a:xfrm>
+          <a:off x="0" y="0"/>
+          <a:ext cx="0" cy="0"/>
+          <a:chOff x="0" y="0"/>
+          <a:chExt cx="0" cy="0"/>
+        </a:xfrm>
+      </p:grpSpPr>
+      <p:sp>
+        <p:nvSpPr>
+          <p:cNvPr id="368642" name="Rectangle 2"/>
+          <p:cNvSpPr>
+            <a:spLocks noGrp="1" noChangeArrowheads="1"/>
+          </p:cNvSpPr>
+          <p:nvPr>
+            <p:ph type="title"/>
+          </p:nvPr>
+        </p:nvSpPr>
+        <p:spPr/>
+        <p:txBody>
+          <a:bodyPr/>
+          <a:lstStyle/>
+          <a:p>
+            <a:pPr algn="ctr"/>
+            <a:r>
+              <a:rPr lang="en-US" dirty="0"/>
+              <a:t>A First </a:t>
+            </a:r>
+            <a:r>
+              <a:rPr lang="en-US" dirty="0" smtClean="0"/>
+              <a:t>Example</a:t>
+            </a:r>
+            <a:endParaRPr lang="en-US" dirty="0"/>
+          </a:p>
+        </p:txBody>
+      </p:sp>
+      <p:pic>
+        <p:nvPicPr>
+          <p:cNvPr id="368643" name="Picture 3"/>
+          <p:cNvPicPr>
+            <a:picLocks noChangeAspect="1" noChangeArrowheads="1"/>
+          </p:cNvPicPr>
+          <p:nvPr/>
+        </p:nvPicPr>
+        <p:blipFill>
+          <a:blip r:embed="rId3">
+            <a:extLst>
+              <a:ext uri="{28A0092B-C50C-407E-A947-70E740481C1C}">
+                <a14:useLocalDpi xmlns:a14="http://schemas.microsoft.com/office/drawing/2010/main" val="0"/>
+              </a:ext>
+            </a:extLst>
+          </a:blip>
+          <a:srcRect/>
+          <a:stretch>
+            <a:fillRect/>
+          </a:stretch>
+        </p:blipFill>
+        <p:spPr bwMode="auto">
+          <a:xfrm>
+            <a:off x="1219200" y="1417638"/>
+            <a:ext cx="7210425" cy="4857750"/>
+          </a:xfrm>
+          <a:prstGeom prst="rect">
+            <a:avLst/>
+          </a:prstGeom>
+          <a:noFill/>
+          <a:ln>
+            <a:noFill/>
+          </a:ln>
+          <a:effectLst/>
+          <a:extLst>
+            <a:ext uri="{909E8E84-426E-40dd-AFC4-6F175D3DCCD1}">
+              <a14:hiddenFill xmlns:a14="http://schemas.microsoft.com/office/drawing/2010/main">
+                <a:solidFill>
+                  <a:schemeClr val="accent1"/>
+                </a:solidFill>
+              </a14:hiddenFill>
+            </a:ext>
+            <a:ext uri="{91240B29-F687-4f45-9708-019B960494DF}">
+              <a14:hiddenLine xmlns:a14="http://schemas.microsoft.com/office/drawing/2010/main" w="9525">
+                <a:solidFill>
+                  <a:schemeClr val="tx1"/>
+                </a:solidFill>
+                <a:miter lim="800000"/>
+                <a:headEnd/>
+                <a:tailEnd/>
+              </a14:hiddenLine>
+            </a:ext>
+            <a:ext uri="{AF507438-7753-43e0-B8FC-AC1667EBCBE1}">
+              <a14:hiddenEffects xmlns:a14="http://schemas.microsoft.com/office/drawing/2010/main">
+                <a:effectLst>
+                  <a:outerShdw blurRad="63500" dist="38099" dir="2700000" algn="ctr" rotWithShape="0">
+                    <a:schemeClr val="bg2">
+                      <a:alpha val="74998"/>
+                    </a:schemeClr>
+                  </a:outerShdw>
+                </a:effectLst>
+              </a14:hiddenEffects>
+            </a:ext>
+          </a:extLst>
+        </p:spPr>
+      </p:pic>
+      <p:sp>
+        <p:nvSpPr>
+          <p:cNvPr id="368645" name="Line 5"/>
+          <p:cNvSpPr>
+            <a:spLocks noChangeShapeType="1"/>
+          </p:cNvSpPr>
+          <p:nvPr/>
+        </p:nvSpPr>
+        <p:spPr bwMode="auto">
+          <a:xfrm>
+            <a:off x="2209800" y="4775169"/>
+            <a:ext cx="5867400" cy="0"/>
+          </a:xfrm>
+          <a:prstGeom prst="line">
+            <a:avLst/>
+          </a:prstGeom>
+          <a:noFill/>
+          <a:ln w="57150">
+            <a:solidFill>
+              <a:schemeClr val="hlink"/>
+            </a:solidFill>
+            <a:prstDash val="dash"/>
+            <a:round/>
+            <a:headEnd/>
+            <a:tailEnd/>
+          </a:ln>
+          <a:effectLst/>
+          <a:extLst>
+            <a:ext uri="{909E8E84-426E-40dd-AFC4-6F175D3DCCD1}">
+              <a14:hiddenFill xmlns:a14="http://schemas.microsoft.com/office/drawing/2010/main">
+                <a:noFill/>
+              </a14:hiddenFill>
+            </a:ext>
+            <a:ext uri="{AF507438-7753-43e0-B8FC-AC1667EBCBE1}">
+              <a14:hiddenEffects xmlns:a14="http://schemas.microsoft.com/office/drawing/2010/main">
+                <a:effectLst>
+                  <a:outerShdw blurRad="63500" dist="38099" dir="2700000" algn="ctr" rotWithShape="0">
+                    <a:schemeClr val="bg2">
+                      <a:alpha val="74998"/>
+                    </a:schemeClr>
+                  </a:outerShdw>
+                </a:effectLst>
+              </a14:hiddenEffects>
+            </a:ext>
+          </a:extLst>
+        </p:spPr>
+        <p:txBody>
+          <a:bodyPr wrap="none"/>
+          <a:lstStyle/>
+          <a:p>
+            <a:endParaRPr lang="en-US"/>
+          </a:p>
+        </p:txBody>
+      </p:sp>
+      <p:graphicFrame>
+        <p:nvGraphicFramePr>
+          <p:cNvPr id="368646" name="Object 6"/>
+          <p:cNvGraphicFramePr>
+            <a:graphicFrameLocks noChangeAspect="1"/>
+          </p:cNvGraphicFramePr>
+          <p:nvPr>
+            <p:extLst>
+              <p:ext uri="{D42A27DB-BD31-4B8C-83A1-F6EECF244321}">
+                <p14:modId xmlns:p14="http://schemas.microsoft.com/office/powerpoint/2010/main" val="3640209616"/>
+              </p:ext>
+            </p:extLst>
+          </p:nvPr>
+        </p:nvGraphicFramePr>
+        <p:xfrm>
+          <a:off x="5715000" y="3985919"/>
+          <a:ext cx="2322513" cy="749300"/>
+        </p:xfrm>
+        <a:graphic>
+          <a:graphicData uri="http://schemas.openxmlformats.org/presentationml/2006/ole">
+            <mc:AlternateContent xmlns:mc="http://schemas.openxmlformats.org/markup-compatibility/2006">
+              <mc:Choice xmlns:v="urn:schemas-microsoft-com:vml" Requires="v">
+                <p:oleObj spid="_x0000_s27654" name="Equation" r:id="rId4" imgW="1218960" imgH="393480" progId="Equation.3">
+                  <p:embed/>
+                </p:oleObj>
+              </mc:Choice>
+              <mc:Fallback>
+                <p:oleObj name="Equation" r:id="rId4" imgW="1218960" imgH="393480" progId="Equation.3">
+                  <p:embed/>
+                  <p:pic>
+                    <p:nvPicPr>
+                      <p:cNvPr id="0" name=""/>
+                      <p:cNvPicPr>
+                        <a:picLocks noChangeAspect="1" noChangeArrowheads="1"/>
+                      </p:cNvPicPr>
+                      <p:nvPr/>
+                    </p:nvPicPr>
+                    <p:blipFill>
+                      <a:blip r:embed="rId5">
+                        <a:extLst>
+                          <a:ext uri="{28A0092B-C50C-407E-A947-70E740481C1C}">
+                            <a14:useLocalDpi xmlns:a14="http://schemas.microsoft.com/office/drawing/2010/main" val="0"/>
+                          </a:ext>
+                        </a:extLst>
+                      </a:blip>
+                      <a:srcRect/>
+                      <a:stretch>
+                        <a:fillRect/>
+                      </a:stretch>
+                    </p:blipFill>
+                    <p:spPr bwMode="auto">
+                      <a:xfrm>
+                        <a:off x="5715000" y="3985919"/>
+                        <a:ext cx="2322513" cy="749300"/>
+                      </a:xfrm>
+                      <a:prstGeom prst="rect">
+                        <a:avLst/>
+                      </a:prstGeom>
+                      <a:noFill/>
+                      <a:ln>
+                        <a:noFill/>
+                      </a:ln>
+                      <a:effectLst/>
+                      <a:extLst>
+                        <a:ext uri="{909E8E84-426E-40dd-AFC4-6F175D3DCCD1}">
+                          <a14:hiddenFill xmlns:a14="http://schemas.microsoft.com/office/drawing/2010/main">
+                            <a:solidFill>
+                              <a:srgbClr val="FFFFFF"/>
+                            </a:solidFill>
+                          </a14:hiddenFill>
+                        </a:ext>
+                        <a:ext uri="{91240B29-F687-4f45-9708-019B960494DF}">
+                          <a14:hiddenLine xmlns:a14="http://schemas.microsoft.com/office/drawing/2010/main" w="9525">
+                            <a:solidFill>
+                              <a:srgbClr val="000000"/>
+                            </a:solidFill>
+                            <a:miter lim="800000"/>
+                            <a:headEnd/>
+                            <a:tailEnd/>
+                          </a14:hiddenLine>
+                        </a:ext>
+                        <a:ext uri="{AF507438-7753-43e0-B8FC-AC1667EBCBE1}">
+                          <a14:hiddenEffects xmlns:a14="http://schemas.microsoft.com/office/drawing/2010/main">
+                            <a:effectLst>
+                              <a:outerShdw blurRad="63500" dist="38099" dir="2700000" algn="ctr" rotWithShape="0">
+                                <a:srgbClr val="000000">
+                                  <a:alpha val="74998"/>
+                                </a:srgbClr>
+                              </a:outerShdw>
+                            </a:effectLst>
+                          </a14:hiddenEffects>
+                        </a:ext>
+                      </a:extLst>
+                    </p:spPr>
+                  </p:pic>
+                </p:oleObj>
+              </mc:Fallback>
+            </mc:AlternateContent>
+          </a:graphicData>
+        </a:graphic>
+      </p:graphicFrame>
+      <p:sp>
+        <p:nvSpPr>
+          <p:cNvPr id="368647" name="Line 7"/>
+          <p:cNvSpPr>
+            <a:spLocks noChangeShapeType="1"/>
+          </p:cNvSpPr>
+          <p:nvPr/>
+        </p:nvSpPr>
+        <p:spPr bwMode="auto">
+          <a:xfrm flipH="1">
+            <a:off x="3276600" y="4419600"/>
+            <a:ext cx="228600" cy="914400"/>
+          </a:xfrm>
+          <a:prstGeom prst="line">
+            <a:avLst/>
+          </a:prstGeom>
+          <a:noFill/>
+          <a:ln w="38100">
+            <a:solidFill>
+              <a:schemeClr val="tx2"/>
+            </a:solidFill>
+            <a:round/>
+            <a:headEnd/>
+            <a:tailEnd type="triangle" w="med" len="med"/>
+          </a:ln>
+          <a:effectLst/>
+          <a:extLst>
+            <a:ext uri="{909E8E84-426E-40dd-AFC4-6F175D3DCCD1}">
+              <a14:hiddenFill xmlns:a14="http://schemas.microsoft.com/office/drawing/2010/main">
+                <a:noFill/>
+              </a14:hiddenFill>
+            </a:ext>
+            <a:ext uri="{AF507438-7753-43e0-B8FC-AC1667EBCBE1}">
+              <a14:hiddenEffects xmlns:a14="http://schemas.microsoft.com/office/drawing/2010/main">
+                <a:effectLst>
+                  <a:outerShdw blurRad="63500" dist="38099" dir="2700000" algn="ctr" rotWithShape="0">
+                    <a:schemeClr val="bg2">
+                      <a:alpha val="74998"/>
+                    </a:schemeClr>
+                  </a:outerShdw>
+                </a:effectLst>
+              </a14:hiddenEffects>
+            </a:ext>
+          </a:extLst>
+        </p:spPr>
+        <p:txBody>
+          <a:bodyPr wrap="none"/>
+          <a:lstStyle/>
+          <a:p>
+            <a:endParaRPr lang="en-US"/>
+          </a:p>
+        </p:txBody>
+      </p:sp>
+      <p:sp>
+        <p:nvSpPr>
+          <p:cNvPr id="368648" name="Line 8"/>
+          <p:cNvSpPr>
+            <a:spLocks noChangeShapeType="1"/>
+          </p:cNvSpPr>
+          <p:nvPr/>
+        </p:nvSpPr>
+        <p:spPr bwMode="auto">
+          <a:xfrm>
+            <a:off x="4648200" y="4419600"/>
+            <a:ext cx="228600" cy="914400"/>
+          </a:xfrm>
+          <a:prstGeom prst="line">
+            <a:avLst/>
+          </a:prstGeom>
+          <a:noFill/>
+          <a:ln w="38100">
+            <a:solidFill>
+              <a:schemeClr val="tx2"/>
+            </a:solidFill>
+            <a:round/>
+            <a:headEnd/>
+            <a:tailEnd type="triangle" w="med" len="med"/>
+          </a:ln>
+          <a:effectLst/>
+          <a:extLst>
+            <a:ext uri="{909E8E84-426E-40dd-AFC4-6F175D3DCCD1}">
+              <a14:hiddenFill xmlns:a14="http://schemas.microsoft.com/office/drawing/2010/main">
+                <a:noFill/>
+              </a14:hiddenFill>
+            </a:ext>
+            <a:ext uri="{AF507438-7753-43e0-B8FC-AC1667EBCBE1}">
+              <a14:hiddenEffects xmlns:a14="http://schemas.microsoft.com/office/drawing/2010/main">
+                <a:effectLst>
+                  <a:outerShdw blurRad="63500" dist="38099" dir="2700000" algn="ctr" rotWithShape="0">
+                    <a:schemeClr val="bg2">
+                      <a:alpha val="74998"/>
+                    </a:schemeClr>
+                  </a:outerShdw>
+                </a:effectLst>
+              </a14:hiddenEffects>
+            </a:ext>
+          </a:extLst>
+        </p:spPr>
+        <p:txBody>
+          <a:bodyPr wrap="none"/>
+          <a:lstStyle/>
+          <a:p>
+            <a:endParaRPr lang="en-US"/>
+          </a:p>
+        </p:txBody>
+      </p:sp>
+      <p:sp>
+        <p:nvSpPr>
+          <p:cNvPr id="368649" name="Text Box 9"/>
+          <p:cNvSpPr txBox="1">
+            <a:spLocks noChangeArrowheads="1"/>
+          </p:cNvSpPr>
+          <p:nvPr/>
+        </p:nvSpPr>
+        <p:spPr bwMode="auto">
+          <a:xfrm>
+            <a:off x="2954843" y="3962400"/>
+            <a:ext cx="2995612" cy="457200"/>
+          </a:xfrm>
+          <a:prstGeom prst="rect">
+            <a:avLst/>
+          </a:prstGeom>
+          <a:noFill/>
+          <a:ln>
+            <a:noFill/>
+          </a:ln>
+          <a:effectLst/>
+          <a:extLst>
+            <a:ext uri="{909E8E84-426E-40dd-AFC4-6F175D3DCCD1}">
+              <a14:hiddenFill xmlns:a14="http://schemas.microsoft.com/office/drawing/2010/main">
+                <a:solidFill>
+                  <a:schemeClr val="accent1"/>
+                </a:solidFill>
+              </a14:hiddenFill>
+            </a:ext>
+            <a:ext uri="{91240B29-F687-4f45-9708-019B960494DF}">
+              <a14:hiddenLine xmlns:a14="http://schemas.microsoft.com/office/drawing/2010/main" w="9525">
+                <a:solidFill>
+                  <a:schemeClr val="tx1"/>
+                </a:solidFill>
+                <a:miter lim="800000"/>
+                <a:headEnd/>
+                <a:tailEnd/>
+              </a14:hiddenLine>
+            </a:ext>
+            <a:ext uri="{AF507438-7753-43e0-B8FC-AC1667EBCBE1}">
+              <a14:hiddenEffects xmlns:a14="http://schemas.microsoft.com/office/drawing/2010/main">
+                <a:effectLst>
+                  <a:outerShdw blurRad="63500" dist="38099" dir="2700000" algn="ctr" rotWithShape="0">
+                    <a:schemeClr val="bg2">
+                      <a:alpha val="74998"/>
+                    </a:schemeClr>
+                  </a:outerShdw>
+                </a:effectLst>
+              </a14:hiddenEffects>
+            </a:ext>
+          </a:extLst>
+        </p:spPr>
+        <p:txBody>
+          <a:bodyPr>
+            <a:spAutoFit/>
+          </a:bodyPr>
+          <a:lstStyle/>
+          <a:p>
+            <a:r>
+              <a:rPr lang="en-US" dirty="0"/>
+              <a:t>Approximate 95% CI</a:t>
+            </a:r>
+          </a:p>
+        </p:txBody>
+      </p:sp>
+      <p:sp>
+        <p:nvSpPr>
+          <p:cNvPr id="368650" name="Text Box 10"/>
+          <p:cNvSpPr txBox="1">
+            <a:spLocks noChangeArrowheads="1"/>
+          </p:cNvSpPr>
+          <p:nvPr/>
+        </p:nvSpPr>
+        <p:spPr bwMode="auto">
+          <a:xfrm>
+            <a:off x="2286000" y="2286000"/>
+            <a:ext cx="3805238" cy="1187450"/>
+          </a:xfrm>
+          <a:prstGeom prst="rect">
+            <a:avLst/>
+          </a:prstGeom>
+          <a:noFill/>
+          <a:ln>
+            <a:noFill/>
+          </a:ln>
+          <a:effectLst/>
+          <a:extLst>
+            <a:ext uri="{909E8E84-426E-40dd-AFC4-6F175D3DCCD1}">
+              <a14:hiddenFill xmlns:a14="http://schemas.microsoft.com/office/drawing/2010/main">
+                <a:solidFill>
+                  <a:schemeClr val="accent1"/>
+                </a:solidFill>
+              </a14:hiddenFill>
+            </a:ext>
+            <a:ext uri="{91240B29-F687-4f45-9708-019B960494DF}">
+              <a14:hiddenLine xmlns:a14="http://schemas.microsoft.com/office/drawing/2010/main" w="9525">
+                <a:solidFill>
+                  <a:schemeClr val="tx1"/>
+                </a:solidFill>
+                <a:miter lim="800000"/>
+                <a:headEnd/>
+                <a:tailEnd/>
+              </a14:hiddenLine>
+            </a:ext>
+            <a:ext uri="{AF507438-7753-43e0-B8FC-AC1667EBCBE1}">
+              <a14:hiddenEffects xmlns:a14="http://schemas.microsoft.com/office/drawing/2010/main">
+                <a:effectLst>
+                  <a:outerShdw blurRad="63500" dist="38099" dir="2700000" algn="ctr" rotWithShape="0">
+                    <a:schemeClr val="bg2">
+                      <a:alpha val="74998"/>
+                    </a:schemeClr>
+                  </a:outerShdw>
+                </a:effectLst>
+              </a14:hiddenEffects>
+            </a:ext>
+          </a:extLst>
+        </p:spPr>
+        <p:txBody>
+          <a:bodyPr>
+            <a:spAutoFit/>
+          </a:bodyPr>
+          <a:lstStyle/>
+          <a:p>
+            <a:r>
+              <a:rPr lang="en-US">
+                <a:solidFill>
+                  <a:schemeClr val="hlink"/>
+                </a:solidFill>
+              </a:rPr>
+              <a:t>We can compute confidence intervals from likelihood profiles</a:t>
+            </a:r>
+          </a:p>
+        </p:txBody>
+      </p:sp>
+    </p:spTree>
+    <p:extLst>
+      <p:ext uri="{BB962C8B-B14F-4D97-AF65-F5344CB8AC3E}">
+        <p14:creationId xmlns:p14="http://schemas.microsoft.com/office/powerpoint/2010/main" val="267144838"/>
+      </p:ext>
+    </p:extLst>
+  </p:cSld>
+  <p:clrMapOvr>
+    <a:masterClrMapping/>
+  </p:clrMapOvr>
+</p:sld>
+</file>
+
+<file path=ppt/slides/slide36.xml><?xml version="1.0" encoding="utf-8"?>
+<p:sld xmlns:a="http://schemas.openxmlformats.org/drawingml/2006/main" xmlns:r="http://schemas.openxmlformats.org/officeDocument/2006/relationships" xmlns:p="http://schemas.openxmlformats.org/presentationml/2006/main">
+  <p:cSld>
+    <p:spTree>
+      <p:nvGrpSpPr>
+        <p:cNvPr id="1" name=""/>
+        <p:cNvGrpSpPr/>
+        <p:nvPr/>
+      </p:nvGrpSpPr>
+      <p:grpSpPr>
+        <a:xfrm>
+          <a:off x="0" y="0"/>
+          <a:ext cx="0" cy="0"/>
+          <a:chOff x="0" y="0"/>
+          <a:chExt cx="0" cy="0"/>
+        </a:xfrm>
+      </p:grpSpPr>
+      <p:sp>
+        <p:nvSpPr>
+          <p:cNvPr id="369666" name="Rectangle 2"/>
+          <p:cNvSpPr>
+            <a:spLocks noGrp="1" noChangeArrowheads="1"/>
+          </p:cNvSpPr>
+          <p:nvPr>
+            <p:ph type="title"/>
+          </p:nvPr>
+        </p:nvSpPr>
+        <p:spPr/>
+        <p:txBody>
+          <a:bodyPr>
+            <a:normAutofit fontScale="90000"/>
+          </a:bodyPr>
+          <a:lstStyle/>
+          <a:p>
+            <a:pPr algn="ctr"/>
+            <a:r>
+              <a:rPr lang="en-US"/>
+              <a:t>Likelihood profiles and confidence intervals</a:t>
+            </a:r>
+          </a:p>
+        </p:txBody>
+      </p:sp>
+      <p:sp>
+        <p:nvSpPr>
+          <p:cNvPr id="369667" name="Rectangle 3"/>
+          <p:cNvSpPr>
+            <a:spLocks noGrp="1" noChangeArrowheads="1"/>
+          </p:cNvSpPr>
+          <p:nvPr>
+            <p:ph type="body" idx="1"/>
+          </p:nvPr>
+        </p:nvSpPr>
+        <p:spPr/>
+        <p:txBody>
+          <a:bodyPr/>
+          <a:lstStyle/>
+          <a:p>
+            <a:pPr marL="0" indent="0">
+              <a:buNone/>
+            </a:pPr>
+            <a:r>
+              <a:rPr lang="en-US" dirty="0"/>
+              <a:t>An 100-</a:t>
+            </a:r>
+            <a:r>
+              <a:rPr lang="en-US" i="1" dirty="0"/>
+              <a:t>x</a:t>
+            </a:r>
+            <a:r>
+              <a:rPr lang="en-US" dirty="0"/>
+              <a:t>% confidence interval for </a:t>
+            </a:r>
+            <a:r>
+              <a:rPr lang="en-US" i="1" dirty="0"/>
+              <a:t>p</a:t>
+            </a:r>
+            <a:r>
+              <a:rPr lang="en-US" dirty="0"/>
+              <a:t> parameters is determined by finding the values for the parameter(s) for which:</a:t>
+            </a:r>
+          </a:p>
+          <a:p>
+            <a:endParaRPr lang="en-US" dirty="0"/>
+          </a:p>
+          <a:p>
+            <a:pPr marL="0" indent="0">
+              <a:buNone/>
+            </a:pPr>
+            <a:endParaRPr lang="en-US" dirty="0" smtClean="0"/>
+          </a:p>
+          <a:p>
+            <a:pPr marL="0" indent="0">
+              <a:buNone/>
+            </a:pPr>
+            <a:r>
+              <a:rPr lang="en-US" dirty="0" smtClean="0"/>
+              <a:t>w</a:t>
+            </a:r>
+            <a:r>
+              <a:rPr lang="en-US" dirty="0" smtClean="0"/>
+              <a:t>here </a:t>
+            </a:r>
+            <a:r>
+              <a:rPr lang="en-US" dirty="0" err="1" smtClean="0"/>
+              <a:t>ln</a:t>
+            </a:r>
+            <a:r>
+              <a:rPr lang="en-US" i="1" dirty="0" err="1" smtClean="0"/>
+              <a:t>L</a:t>
+            </a:r>
+            <a:r>
+              <a:rPr lang="en-US" i="1" baseline="-25000" dirty="0" err="1" smtClean="0"/>
+              <a:t>MLE</a:t>
+            </a:r>
+            <a:r>
+              <a:rPr lang="en-US" i="1" dirty="0" smtClean="0"/>
+              <a:t>  </a:t>
+            </a:r>
+            <a:r>
+              <a:rPr lang="en-US" dirty="0" smtClean="0"/>
+              <a:t>is </a:t>
+            </a:r>
+            <a:r>
+              <a:rPr lang="en-US" dirty="0"/>
+              <a:t>the negative log-likelihood corresponding to the maximum likelihood estimates.</a:t>
+            </a:r>
+          </a:p>
+          <a:p>
+            <a:endParaRPr lang="en-US" dirty="0"/>
+          </a:p>
+          <a:p>
+            <a:endParaRPr lang="en-US" dirty="0"/>
+          </a:p>
+          <a:p>
+            <a:endParaRPr lang="en-US" dirty="0"/>
+          </a:p>
+        </p:txBody>
+      </p:sp>
+      <p:graphicFrame>
+        <p:nvGraphicFramePr>
+          <p:cNvPr id="369668" name="Object 4"/>
+          <p:cNvGraphicFramePr>
+            <a:graphicFrameLocks noChangeAspect="1"/>
+          </p:cNvGraphicFramePr>
+          <p:nvPr>
+            <p:extLst>
+              <p:ext uri="{D42A27DB-BD31-4B8C-83A1-F6EECF244321}">
+                <p14:modId xmlns:p14="http://schemas.microsoft.com/office/powerpoint/2010/main" val="3397310531"/>
+              </p:ext>
+            </p:extLst>
+          </p:nvPr>
+        </p:nvGraphicFramePr>
+        <p:xfrm>
+          <a:off x="1433194" y="3426360"/>
+          <a:ext cx="5683583" cy="652447"/>
+        </p:xfrm>
+        <a:graphic>
+          <a:graphicData uri="http://schemas.openxmlformats.org/presentationml/2006/ole">
+            <mc:AlternateContent xmlns:mc="http://schemas.openxmlformats.org/markup-compatibility/2006">
+              <mc:Choice xmlns:v="urn:schemas-microsoft-com:vml" Requires="v">
+                <p:oleObj spid="_x0000_s28678" name="Equation" r:id="rId3" imgW="1993680" imgH="228600" progId="Equation.DSMT4">
+                  <p:embed/>
+                </p:oleObj>
+              </mc:Choice>
+              <mc:Fallback>
+                <p:oleObj name="Equation" r:id="rId3" imgW="1993680" imgH="228600" progId="Equation.DSMT4">
+                  <p:embed/>
+                  <p:pic>
+                    <p:nvPicPr>
+                      <p:cNvPr id="0" name=""/>
+                      <p:cNvPicPr>
+                        <a:picLocks noChangeAspect="1" noChangeArrowheads="1"/>
+                      </p:cNvPicPr>
+                      <p:nvPr/>
+                    </p:nvPicPr>
+                    <p:blipFill>
+                      <a:blip r:embed="rId4">
+                        <a:extLst>
+                          <a:ext uri="{28A0092B-C50C-407E-A947-70E740481C1C}">
+                            <a14:useLocalDpi xmlns:a14="http://schemas.microsoft.com/office/drawing/2010/main" val="0"/>
+                          </a:ext>
+                        </a:extLst>
+                      </a:blip>
+                      <a:srcRect/>
+                      <a:stretch>
+                        <a:fillRect/>
+                      </a:stretch>
+                    </p:blipFill>
+                    <p:spPr bwMode="auto">
+                      <a:xfrm>
+                        <a:off x="1433194" y="3426360"/>
+                        <a:ext cx="5683583" cy="652447"/>
+                      </a:xfrm>
+                      <a:prstGeom prst="rect">
+                        <a:avLst/>
+                      </a:prstGeom>
+                      <a:noFill/>
+                      <a:ln>
+                        <a:noFill/>
+                      </a:ln>
+                      <a:effectLst/>
+                      <a:extLst/>
+                    </p:spPr>
+                  </p:pic>
+                </p:oleObj>
+              </mc:Fallback>
+            </mc:AlternateContent>
+          </a:graphicData>
+        </a:graphic>
+      </p:graphicFrame>
+    </p:spTree>
+    <p:extLst>
+      <p:ext uri="{BB962C8B-B14F-4D97-AF65-F5344CB8AC3E}">
+        <p14:creationId xmlns:p14="http://schemas.microsoft.com/office/powerpoint/2010/main" val="1419231063"/>
+      </p:ext>
+    </p:extLst>
+  </p:cSld>
+  <p:clrMapOvr>
+    <a:masterClrMapping/>
+  </p:clrMapOvr>
+</p:sld>
+</file>
+
+<file path=ppt/slides/slide37.xml><?xml version="1.0" encoding="utf-8"?>
+<p:sld xmlns:a="http://schemas.openxmlformats.org/drawingml/2006/main" xmlns:r="http://schemas.openxmlformats.org/officeDocument/2006/relationships" xmlns:p="http://schemas.openxmlformats.org/presentationml/2006/main">
+  <p:cSld>
+    <p:spTree>
+      <p:nvGrpSpPr>
+        <p:cNvPr id="1" name=""/>
+        <p:cNvGrpSpPr/>
+        <p:nvPr/>
+      </p:nvGrpSpPr>
+      <p:grpSpPr>
+        <a:xfrm>
+          <a:off x="0" y="0"/>
+          <a:ext cx="0" cy="0"/>
+          <a:chOff x="0" y="0"/>
+          <a:chExt cx="0" cy="0"/>
+        </a:xfrm>
+      </p:grpSpPr>
+      <p:sp>
+        <p:nvSpPr>
+          <p:cNvPr id="2" name="Title 1"/>
+          <p:cNvSpPr>
+            <a:spLocks noGrp="1"/>
+          </p:cNvSpPr>
+          <p:nvPr>
+            <p:ph type="title"/>
+          </p:nvPr>
+        </p:nvSpPr>
+        <p:spPr/>
+        <p:txBody>
+          <a:bodyPr/>
+          <a:lstStyle/>
+          <a:p>
+            <a:r>
+              <a:rPr lang="en-US" dirty="0" smtClean="0"/>
+              <a:t>Likelihood ratio test and 1.92</a:t>
+            </a:r>
+            <a:endParaRPr lang="en-US" dirty="0"/>
+          </a:p>
+        </p:txBody>
+      </p:sp>
+      <p:graphicFrame>
+        <p:nvGraphicFramePr>
+          <p:cNvPr id="4" name="Object 3"/>
+          <p:cNvGraphicFramePr>
+            <a:graphicFrameLocks noChangeAspect="1"/>
+          </p:cNvGraphicFramePr>
+          <p:nvPr>
+            <p:extLst>
+              <p:ext uri="{D42A27DB-BD31-4B8C-83A1-F6EECF244321}">
+                <p14:modId xmlns:p14="http://schemas.microsoft.com/office/powerpoint/2010/main" val="1884280861"/>
+              </p:ext>
+            </p:extLst>
+          </p:nvPr>
+        </p:nvGraphicFramePr>
+        <p:xfrm>
+          <a:off x="1676400" y="1676400"/>
+          <a:ext cx="6170141" cy="2133600"/>
+        </p:xfrm>
+        <a:graphic>
+          <a:graphicData uri="http://schemas.openxmlformats.org/presentationml/2006/ole">
+            <mc:AlternateContent xmlns:mc="http://schemas.openxmlformats.org/markup-compatibility/2006">
+              <mc:Choice xmlns:v="urn:schemas-microsoft-com:vml" Requires="v">
+                <p:oleObj spid="_x0000_s31748" name="Equation" r:id="rId3" imgW="2717640" imgH="939600" progId="Equation.3">
+                  <p:embed/>
+                </p:oleObj>
+              </mc:Choice>
+              <mc:Fallback>
+                <p:oleObj name="Equation" r:id="rId3" imgW="2717640" imgH="939600" progId="Equation.3">
+                  <p:embed/>
+                  <p:pic>
+                    <p:nvPicPr>
+                      <p:cNvPr id="0" name=""/>
+                      <p:cNvPicPr/>
+                      <p:nvPr/>
+                    </p:nvPicPr>
+                    <p:blipFill>
+                      <a:blip r:embed="rId4"/>
+                      <a:stretch>
+                        <a:fillRect/>
+                      </a:stretch>
+                    </p:blipFill>
+                    <p:spPr>
+                      <a:xfrm>
+                        <a:off x="1676400" y="1676400"/>
+                        <a:ext cx="6170141" cy="2133600"/>
+                      </a:xfrm>
+                      <a:prstGeom prst="rect">
+                        <a:avLst/>
+                      </a:prstGeom>
+                    </p:spPr>
+                  </p:pic>
+                </p:oleObj>
+              </mc:Fallback>
+            </mc:AlternateContent>
+          </a:graphicData>
+        </a:graphic>
+      </p:graphicFrame>
+      <p:sp>
+        <p:nvSpPr>
+          <p:cNvPr id="5" name="TextBox 4"/>
+          <p:cNvSpPr txBox="1"/>
+          <p:nvPr/>
+        </p:nvSpPr>
+        <p:spPr>
+          <a:xfrm>
+            <a:off x="1676400" y="4038600"/>
+            <a:ext cx="5810670" cy="1569660"/>
+          </a:xfrm>
+          <a:prstGeom prst="rect">
+            <a:avLst/>
+          </a:prstGeom>
+          <a:noFill/>
+        </p:spPr>
+        <p:txBody>
+          <a:bodyPr wrap="square" rtlCol="0">
+            <a:spAutoFit/>
+          </a:bodyPr>
+          <a:lstStyle/>
+          <a:p>
+            <a:r>
+              <a:rPr lang="en-US" sz="2400" dirty="0" smtClean="0">
+                <a:solidFill>
+                  <a:schemeClr val="accent1">
+                    <a:lumMod val="75000"/>
+                  </a:schemeClr>
+                </a:solidFill>
+              </a:rPr>
+              <a:t>When the NLL for a model parameter is more than 1.92 units from the MLE, that is the 95% confidence interval (asymptotically for large sample size, when well behaved, etc.)</a:t>
+            </a:r>
+            <a:endParaRPr lang="en-US" sz="2400" dirty="0">
+              <a:solidFill>
+                <a:schemeClr val="accent1">
+                  <a:lumMod val="75000"/>
+                </a:schemeClr>
+              </a:solidFill>
+            </a:endParaRPr>
+          </a:p>
+        </p:txBody>
+      </p:sp>
+    </p:spTree>
+    <p:extLst>
+      <p:ext uri="{BB962C8B-B14F-4D97-AF65-F5344CB8AC3E}">
+        <p14:creationId xmlns:p14="http://schemas.microsoft.com/office/powerpoint/2010/main" val="3628890710"/>
+      </p:ext>
+    </p:extLst>
+  </p:cSld>
+  <p:clrMapOvr>
+    <a:masterClrMapping/>
+  </p:clrMapOvr>
+</p:sld>
+</file>
+
+<file path=ppt/slides/slide38.xml><?xml version="1.0" encoding="utf-8"?>
+<p:sld xmlns:a="http://schemas.openxmlformats.org/drawingml/2006/main" xmlns:r="http://schemas.openxmlformats.org/officeDocument/2006/relationships" xmlns:p="http://schemas.openxmlformats.org/presentationml/2006/main">
+  <p:cSld>
+    <p:spTree>
+      <p:nvGrpSpPr>
+        <p:cNvPr id="1" name=""/>
+        <p:cNvGrpSpPr/>
+        <p:nvPr/>
+      </p:nvGrpSpPr>
+      <p:grpSpPr>
+        <a:xfrm>
+          <a:off x="0" y="0"/>
+          <a:ext cx="0" cy="0"/>
+          <a:chOff x="0" y="0"/>
+          <a:chExt cx="0" cy="0"/>
+        </a:xfrm>
+      </p:grpSpPr>
+      <p:sp>
+        <p:nvSpPr>
+          <p:cNvPr id="366594" name="Rectangle 2"/>
+          <p:cNvSpPr>
+            <a:spLocks noGrp="1" noChangeArrowheads="1"/>
+          </p:cNvSpPr>
+          <p:nvPr>
+            <p:ph type="title"/>
+          </p:nvPr>
+        </p:nvSpPr>
+        <p:spPr/>
+        <p:txBody>
+          <a:bodyPr>
+            <a:normAutofit fontScale="90000"/>
+          </a:bodyPr>
+          <a:lstStyle/>
+          <a:p>
+            <a:pPr algn="ctr"/>
+            <a:r>
+              <a:rPr lang="en-US"/>
+              <a:t>Likelihood Profile </a:t>
+            </a:r>
+            <a:br>
+              <a:rPr lang="en-US"/>
+            </a:br>
+            <a:r>
+              <a:rPr lang="en-US"/>
+              <a:t>(multiple parameters)</a:t>
+            </a:r>
+          </a:p>
+        </p:txBody>
+      </p:sp>
+      <p:sp>
+        <p:nvSpPr>
+          <p:cNvPr id="366595" name="Rectangle 3"/>
+          <p:cNvSpPr>
+            <a:spLocks noGrp="1" noChangeArrowheads="1"/>
+          </p:cNvSpPr>
+          <p:nvPr>
+            <p:ph type="body" idx="1"/>
+          </p:nvPr>
+        </p:nvSpPr>
+        <p:spPr/>
+        <p:txBody>
+          <a:bodyPr/>
+          <a:lstStyle/>
+          <a:p>
+            <a:pPr marL="609600" indent="-609600">
+              <a:lnSpc>
+                <a:spcPct val="90000"/>
+              </a:lnSpc>
+              <a:buFont typeface="Wingdings" charset="0"/>
+              <a:buAutoNum type="arabicPeriod"/>
+            </a:pPr>
+            <a:r>
+              <a:rPr lang="en-US" sz="2600"/>
+              <a:t>Fit the model to find the ML parameter estimates and the corresponding negative log-likelihood.</a:t>
+            </a:r>
+          </a:p>
+          <a:p>
+            <a:pPr marL="609600" indent="-609600">
+              <a:lnSpc>
+                <a:spcPct val="90000"/>
+              </a:lnSpc>
+              <a:buFont typeface="Wingdings" charset="0"/>
+              <a:buAutoNum type="arabicPeriod"/>
+            </a:pPr>
+            <a:r>
+              <a:rPr lang="en-US" sz="2600"/>
+              <a:t>Select a set of fixed parameter combinations for the set of parameters of interest.</a:t>
+            </a:r>
+          </a:p>
+          <a:p>
+            <a:pPr marL="609600" indent="-609600">
+              <a:lnSpc>
+                <a:spcPct val="90000"/>
+              </a:lnSpc>
+              <a:buFont typeface="Wingdings" charset="0"/>
+              <a:buAutoNum type="arabicPeriod"/>
+            </a:pPr>
+            <a:r>
+              <a:rPr lang="en-US" sz="2600"/>
+              <a:t>Minimize the negative log-likelihood fixing the values for the set of parameters of interest to each set of values in turn.</a:t>
+            </a:r>
+          </a:p>
+          <a:p>
+            <a:pPr marL="609600" indent="-609600">
+              <a:lnSpc>
+                <a:spcPct val="90000"/>
+              </a:lnSpc>
+              <a:buFont typeface="Wingdings" charset="0"/>
+              <a:buAutoNum type="arabicPeriod"/>
+            </a:pPr>
+            <a:r>
+              <a:rPr lang="en-US" sz="2600"/>
+              <a:t>Plot the difference between the negative log-likelihood from step 1 and those from step 3 (this creates a surface).</a:t>
+            </a:r>
+          </a:p>
+        </p:txBody>
+      </p:sp>
+    </p:spTree>
+    <p:extLst>
+      <p:ext uri="{BB962C8B-B14F-4D97-AF65-F5344CB8AC3E}">
+        <p14:creationId xmlns:p14="http://schemas.microsoft.com/office/powerpoint/2010/main" val="2264996246"/>
+      </p:ext>
+    </p:extLst>
+  </p:cSld>
+  <p:clrMapOvr>
+    <a:masterClrMapping/>
+  </p:clrMapOvr>
+</p:sld>
+</file>
+
+<file path=ppt/slides/slide39.xml><?xml version="1.0" encoding="utf-8"?>
+<p:sld xmlns:a="http://schemas.openxmlformats.org/drawingml/2006/main" xmlns:r="http://schemas.openxmlformats.org/officeDocument/2006/relationships" xmlns:p="http://schemas.openxmlformats.org/presentationml/2006/main">
+  <p:cSld>
+    <p:spTree>
+      <p:nvGrpSpPr>
+        <p:cNvPr id="1" name=""/>
+        <p:cNvGrpSpPr/>
+        <p:nvPr/>
+      </p:nvGrpSpPr>
+      <p:grpSpPr>
+        <a:xfrm>
+          <a:off x="0" y="0"/>
+          <a:ext cx="0" cy="0"/>
+          <a:chOff x="0" y="0"/>
+          <a:chExt cx="0" cy="0"/>
+        </a:xfrm>
+      </p:grpSpPr>
+      <p:sp>
+        <p:nvSpPr>
+          <p:cNvPr id="370690" name="Rectangle 2"/>
+          <p:cNvSpPr>
+            <a:spLocks noGrp="1" noChangeArrowheads="1"/>
+          </p:cNvSpPr>
+          <p:nvPr>
+            <p:ph type="title"/>
+          </p:nvPr>
+        </p:nvSpPr>
+        <p:spPr/>
+        <p:txBody>
+          <a:bodyPr/>
+          <a:lstStyle/>
+          <a:p>
+            <a:pPr algn="ctr"/>
+            <a:r>
+              <a:rPr lang="en-US"/>
+              <a:t>What about State Variables-I</a:t>
+            </a:r>
+          </a:p>
+        </p:txBody>
+      </p:sp>
+      <p:sp>
+        <p:nvSpPr>
+          <p:cNvPr id="370691" name="Rectangle 3"/>
+          <p:cNvSpPr>
+            <a:spLocks noGrp="1" noChangeArrowheads="1"/>
+          </p:cNvSpPr>
+          <p:nvPr>
+            <p:ph type="body" idx="1"/>
+          </p:nvPr>
+        </p:nvSpPr>
+        <p:spPr/>
+        <p:txBody>
+          <a:bodyPr/>
+          <a:lstStyle/>
+          <a:p>
+            <a:r>
+              <a:rPr lang="en-US" sz="2800"/>
+              <a:t>Model outputs often include population size, harvest rate, etc. We are usually more interested in these quantities than about the parameters themselves.</a:t>
+            </a:r>
+          </a:p>
+          <a:p>
+            <a:r>
+              <a:rPr lang="en-US" sz="2800"/>
+              <a:t>However, the state variables are seldom parameters of the model (and cannot be made to be parameters of the model). This makes computing a likelihood profile for them difficult.</a:t>
+            </a:r>
+          </a:p>
+        </p:txBody>
+      </p:sp>
+    </p:spTree>
+    <p:extLst>
+      <p:ext uri="{BB962C8B-B14F-4D97-AF65-F5344CB8AC3E}">
+        <p14:creationId xmlns:p14="http://schemas.microsoft.com/office/powerpoint/2010/main" val="3686868455"/>
+      </p:ext>
+    </p:extLst>
+  </p:cSld>
+  <p:clrMapOvr>
+    <a:masterClrMapping/>
+  </p:clrMapOvr>
+</p:sld>
+</file>
+
 <file path=ppt/slides/slide4.xml><?xml version="1.0" encoding="utf-8"?>
 <p:sld xmlns:a="http://schemas.openxmlformats.org/drawingml/2006/main" xmlns:r="http://schemas.openxmlformats.org/officeDocument/2006/relationships" xmlns:p="http://schemas.openxmlformats.org/presentationml/2006/main">
   <p:cSld>
@@ -11637,6 +13206,399 @@
   <p:clrMapOvr>
     <a:masterClrMapping/>
   </p:clrMapOvr>
+</p:sld>
+</file>
+
+<file path=ppt/slides/slide40.xml><?xml version="1.0" encoding="utf-8"?>
+<p:sld xmlns:a="http://schemas.openxmlformats.org/drawingml/2006/main" xmlns:r="http://schemas.openxmlformats.org/officeDocument/2006/relationships" xmlns:p="http://schemas.openxmlformats.org/presentationml/2006/main">
+  <p:cSld>
+    <p:spTree>
+      <p:nvGrpSpPr>
+        <p:cNvPr id="1" name=""/>
+        <p:cNvGrpSpPr/>
+        <p:nvPr/>
+      </p:nvGrpSpPr>
+      <p:grpSpPr>
+        <a:xfrm>
+          <a:off x="0" y="0"/>
+          <a:ext cx="0" cy="0"/>
+          <a:chOff x="0" y="0"/>
+          <a:chExt cx="0" cy="0"/>
+        </a:xfrm>
+      </p:grpSpPr>
+      <p:sp>
+        <p:nvSpPr>
+          <p:cNvPr id="371714" name="Rectangle 2"/>
+          <p:cNvSpPr>
+            <a:spLocks noGrp="1" noChangeArrowheads="1"/>
+          </p:cNvSpPr>
+          <p:nvPr>
+            <p:ph type="title"/>
+          </p:nvPr>
+        </p:nvSpPr>
+        <p:spPr/>
+        <p:txBody>
+          <a:bodyPr/>
+          <a:lstStyle/>
+          <a:p>
+            <a:r>
+              <a:rPr lang="en-US"/>
+              <a:t>What about State Variables-II</a:t>
+            </a:r>
+          </a:p>
+        </p:txBody>
+      </p:sp>
+      <p:sp>
+        <p:nvSpPr>
+          <p:cNvPr id="371715" name="Rectangle 3"/>
+          <p:cNvSpPr>
+            <a:spLocks noGrp="1" noChangeArrowheads="1"/>
+          </p:cNvSpPr>
+          <p:nvPr>
+            <p:ph type="body" idx="1"/>
+          </p:nvPr>
+        </p:nvSpPr>
+        <p:spPr/>
+        <p:txBody>
+          <a:bodyPr/>
+          <a:lstStyle/>
+          <a:p>
+            <a:r>
+              <a:rPr lang="en-US" sz="2800" dirty="0"/>
+              <a:t>For each (target) value of the State Variable:</a:t>
+            </a:r>
+          </a:p>
+          <a:p>
+            <a:pPr lvl="1"/>
+            <a:r>
+              <a:rPr lang="en-US" sz="2400" dirty="0"/>
+              <a:t>Add a penalty to the negative log-likelihood that increases as the difference between the target value and the model estimate is larger.</a:t>
+            </a:r>
+          </a:p>
+          <a:p>
+            <a:pPr lvl="1"/>
+            <a:endParaRPr lang="en-US" sz="2400" dirty="0"/>
+          </a:p>
+          <a:p>
+            <a:pPr lvl="1"/>
+            <a:endParaRPr lang="en-US" sz="2400" dirty="0"/>
+          </a:p>
+          <a:p>
+            <a:pPr lvl="1"/>
+            <a:r>
+              <a:rPr lang="en-US" sz="2400" dirty="0"/>
+              <a:t>It is often a good idea to change the size of the penalty, </a:t>
+            </a:r>
+            <a:r>
+              <a:rPr lang="en-US" sz="2400" i="1" dirty="0"/>
+              <a:t>w</a:t>
+            </a:r>
+            <a:r>
+              <a:rPr lang="en-US" sz="2400" dirty="0"/>
+              <a:t>, as we get closer to the target (i.e. apply </a:t>
+            </a:r>
+            <a:r>
+              <a:rPr lang="en-US" sz="2400" dirty="0" err="1" smtClean="0"/>
+              <a:t>optim</a:t>
+            </a:r>
+            <a:r>
+              <a:rPr lang="en-US" sz="2400" dirty="0" smtClean="0"/>
+              <a:t>() several </a:t>
+            </a:r>
+            <a:r>
+              <a:rPr lang="en-US" sz="2400" dirty="0"/>
+              <a:t>times, each time increasing </a:t>
+            </a:r>
+            <a:r>
+              <a:rPr lang="en-US" sz="2400" i="1" dirty="0"/>
+              <a:t>w</a:t>
+            </a:r>
+            <a:r>
+              <a:rPr lang="en-US" sz="2400" dirty="0"/>
+              <a:t>)</a:t>
+            </a:r>
+          </a:p>
+        </p:txBody>
+      </p:sp>
+      <p:graphicFrame>
+        <p:nvGraphicFramePr>
+          <p:cNvPr id="371716" name="Object 4"/>
+          <p:cNvGraphicFramePr>
+            <a:graphicFrameLocks noChangeAspect="1"/>
+          </p:cNvGraphicFramePr>
+          <p:nvPr>
+            <p:extLst>
+              <p:ext uri="{D42A27DB-BD31-4B8C-83A1-F6EECF244321}">
+                <p14:modId xmlns:p14="http://schemas.microsoft.com/office/powerpoint/2010/main" val="1652791580"/>
+              </p:ext>
+            </p:extLst>
+          </p:nvPr>
+        </p:nvGraphicFramePr>
+        <p:xfrm>
+          <a:off x="3163888" y="3332162"/>
+          <a:ext cx="3721100" cy="803275"/>
+        </p:xfrm>
+        <a:graphic>
+          <a:graphicData uri="http://schemas.openxmlformats.org/presentationml/2006/ole">
+            <mc:AlternateContent xmlns:mc="http://schemas.openxmlformats.org/markup-compatibility/2006">
+              <mc:Choice xmlns:v="urn:schemas-microsoft-com:vml" Requires="v">
+                <p:oleObj spid="_x0000_s29702" name="Equation" r:id="rId3" imgW="1942920" imgH="419040" progId="Equation.3">
+                  <p:embed/>
+                </p:oleObj>
+              </mc:Choice>
+              <mc:Fallback>
+                <p:oleObj name="Equation" r:id="rId3" imgW="1942920" imgH="419040" progId="Equation.3">
+                  <p:embed/>
+                  <p:pic>
+                    <p:nvPicPr>
+                      <p:cNvPr id="0" name=""/>
+                      <p:cNvPicPr>
+                        <a:picLocks noChangeAspect="1" noChangeArrowheads="1"/>
+                      </p:cNvPicPr>
+                      <p:nvPr/>
+                    </p:nvPicPr>
+                    <p:blipFill>
+                      <a:blip r:embed="rId4">
+                        <a:extLst>
+                          <a:ext uri="{28A0092B-C50C-407E-A947-70E740481C1C}">
+                            <a14:useLocalDpi xmlns:a14="http://schemas.microsoft.com/office/drawing/2010/main" val="0"/>
+                          </a:ext>
+                        </a:extLst>
+                      </a:blip>
+                      <a:srcRect/>
+                      <a:stretch>
+                        <a:fillRect/>
+                      </a:stretch>
+                    </p:blipFill>
+                    <p:spPr bwMode="auto">
+                      <a:xfrm>
+                        <a:off x="3163888" y="3332162"/>
+                        <a:ext cx="3721100" cy="803275"/>
+                      </a:xfrm>
+                      <a:prstGeom prst="rect">
+                        <a:avLst/>
+                      </a:prstGeom>
+                      <a:noFill/>
+                      <a:ln>
+                        <a:noFill/>
+                      </a:ln>
+                      <a:effectLst/>
+                      <a:extLst>
+                        <a:ext uri="{909E8E84-426E-40dd-AFC4-6F175D3DCCD1}">
+                          <a14:hiddenFill xmlns:a14="http://schemas.microsoft.com/office/drawing/2010/main">
+                            <a:solidFill>
+                              <a:srgbClr val="FFFFFF"/>
+                            </a:solidFill>
+                          </a14:hiddenFill>
+                        </a:ext>
+                        <a:ext uri="{91240B29-F687-4f45-9708-019B960494DF}">
+                          <a14:hiddenLine xmlns:a14="http://schemas.microsoft.com/office/drawing/2010/main" w="9525">
+                            <a:solidFill>
+                              <a:srgbClr val="000000"/>
+                            </a:solidFill>
+                            <a:miter lim="800000"/>
+                            <a:headEnd/>
+                            <a:tailEnd/>
+                          </a14:hiddenLine>
+                        </a:ext>
+                        <a:ext uri="{AF507438-7753-43e0-B8FC-AC1667EBCBE1}">
+                          <a14:hiddenEffects xmlns:a14="http://schemas.microsoft.com/office/drawing/2010/main">
+                            <a:effectLst>
+                              <a:outerShdw blurRad="63500" dist="38099" dir="2700000" algn="ctr" rotWithShape="0">
+                                <a:srgbClr val="000000">
+                                  <a:alpha val="74998"/>
+                                </a:srgbClr>
+                              </a:outerShdw>
+                            </a:effectLst>
+                          </a14:hiddenEffects>
+                        </a:ext>
+                      </a:extLst>
+                    </p:spPr>
+                  </p:pic>
+                </p:oleObj>
+              </mc:Fallback>
+            </mc:AlternateContent>
+          </a:graphicData>
+        </a:graphic>
+      </p:graphicFrame>
+    </p:spTree>
+    <p:extLst>
+      <p:ext uri="{BB962C8B-B14F-4D97-AF65-F5344CB8AC3E}">
+        <p14:creationId xmlns:p14="http://schemas.microsoft.com/office/powerpoint/2010/main" val="1357925366"/>
+      </p:ext>
+    </p:extLst>
+  </p:cSld>
+  <p:clrMapOvr>
+    <a:masterClrMapping/>
+  </p:clrMapOvr>
+</p:sld>
+</file>
+
+<file path=ppt/slides/slide41.xml><?xml version="1.0" encoding="utf-8"?>
+<p:sld xmlns:a="http://schemas.openxmlformats.org/drawingml/2006/main" xmlns:r="http://schemas.openxmlformats.org/officeDocument/2006/relationships" xmlns:p="http://schemas.openxmlformats.org/presentationml/2006/main" show="0">
+  <p:cSld>
+    <p:spTree>
+      <p:nvGrpSpPr>
+        <p:cNvPr id="1" name=""/>
+        <p:cNvGrpSpPr/>
+        <p:nvPr/>
+      </p:nvGrpSpPr>
+      <p:grpSpPr>
+        <a:xfrm>
+          <a:off x="0" y="0"/>
+          <a:ext cx="0" cy="0"/>
+          <a:chOff x="0" y="0"/>
+          <a:chExt cx="0" cy="0"/>
+        </a:xfrm>
+      </p:grpSpPr>
+      <p:sp>
+        <p:nvSpPr>
+          <p:cNvPr id="372738" name="Rectangle 2"/>
+          <p:cNvSpPr>
+            <a:spLocks noGrp="1" noChangeArrowheads="1"/>
+          </p:cNvSpPr>
+          <p:nvPr>
+            <p:ph type="title"/>
+          </p:nvPr>
+        </p:nvSpPr>
+        <p:spPr/>
+        <p:txBody>
+          <a:bodyPr/>
+          <a:lstStyle/>
+          <a:p>
+            <a:pPr algn="ctr"/>
+            <a:r>
+              <a:rPr lang="en-US" sz="3200" dirty="0" smtClean="0"/>
+              <a:t>e.g. </a:t>
+            </a:r>
+            <a:r>
+              <a:rPr lang="en-US" sz="3200" dirty="0"/>
+              <a:t>a</a:t>
+            </a:r>
+            <a:r>
+              <a:rPr lang="en-US" sz="3200" dirty="0" smtClean="0"/>
+              <a:t> </a:t>
+            </a:r>
+            <a:r>
+              <a:rPr lang="en-US" sz="3200" dirty="0"/>
+              <a:t>Likelihood Profile for Current Biomass</a:t>
+            </a:r>
+          </a:p>
+        </p:txBody>
+      </p:sp>
+      <p:graphicFrame>
+        <p:nvGraphicFramePr>
+          <p:cNvPr id="372739" name="Object 3"/>
+          <p:cNvGraphicFramePr>
+            <a:graphicFrameLocks noChangeAspect="1"/>
+          </p:cNvGraphicFramePr>
+          <p:nvPr/>
+        </p:nvGraphicFramePr>
+        <p:xfrm>
+          <a:off x="1143000" y="2120900"/>
+          <a:ext cx="7543800" cy="4333875"/>
+        </p:xfrm>
+        <a:graphic>
+          <a:graphicData uri="http://schemas.openxmlformats.org/presentationml/2006/ole">
+            <mc:AlternateContent xmlns:mc="http://schemas.openxmlformats.org/markup-compatibility/2006">
+              <mc:Choice xmlns:v="urn:schemas-microsoft-com:vml" Requires="v">
+                <p:oleObj spid="_x0000_s30726" name="Worksheet" r:id="rId3" imgW="6858191" imgH="3939826" progId="Excel.Sheet.8">
+                  <p:embed/>
+                </p:oleObj>
+              </mc:Choice>
+              <mc:Fallback>
+                <p:oleObj name="Worksheet" r:id="rId3" imgW="6858191" imgH="3939826" progId="Excel.Sheet.8">
+                  <p:embed/>
+                  <p:pic>
+                    <p:nvPicPr>
+                      <p:cNvPr id="0" name=""/>
+                      <p:cNvPicPr>
+                        <a:picLocks noChangeAspect="1" noChangeArrowheads="1"/>
+                      </p:cNvPicPr>
+                      <p:nvPr/>
+                    </p:nvPicPr>
+                    <p:blipFill>
+                      <a:blip r:embed="rId4">
+                        <a:extLst>
+                          <a:ext uri="{28A0092B-C50C-407E-A947-70E740481C1C}">
+                            <a14:useLocalDpi xmlns:a14="http://schemas.microsoft.com/office/drawing/2010/main" val="0"/>
+                          </a:ext>
+                        </a:extLst>
+                      </a:blip>
+                      <a:srcRect/>
+                      <a:stretch>
+                        <a:fillRect/>
+                      </a:stretch>
+                    </p:blipFill>
+                    <p:spPr bwMode="auto">
+                      <a:xfrm>
+                        <a:off x="1143000" y="2120900"/>
+                        <a:ext cx="7543800" cy="4333875"/>
+                      </a:xfrm>
+                      <a:prstGeom prst="rect">
+                        <a:avLst/>
+                      </a:prstGeom>
+                      <a:noFill/>
+                      <a:ln>
+                        <a:noFill/>
+                      </a:ln>
+                      <a:effectLst/>
+                      <a:extLst>
+                        <a:ext uri="{909E8E84-426E-40dd-AFC4-6F175D3DCCD1}">
+                          <a14:hiddenFill xmlns:a14="http://schemas.microsoft.com/office/drawing/2010/main">
+                            <a:solidFill>
+                              <a:schemeClr val="accent1"/>
+                            </a:solidFill>
+                          </a14:hiddenFill>
+                        </a:ext>
+                        <a:ext uri="{91240B29-F687-4f45-9708-019B960494DF}">
+                          <a14:hiddenLine xmlns:a14="http://schemas.microsoft.com/office/drawing/2010/main" w="9525">
+                            <a:solidFill>
+                              <a:schemeClr val="tx1"/>
+                            </a:solidFill>
+                            <a:miter lim="800000"/>
+                            <a:headEnd/>
+                            <a:tailEnd/>
+                          </a14:hiddenLine>
+                        </a:ext>
+                        <a:ext uri="{AF507438-7753-43e0-B8FC-AC1667EBCBE1}">
+                          <a14:hiddenEffects xmlns:a14="http://schemas.microsoft.com/office/drawing/2010/main">
+                            <a:effectLst>
+                              <a:outerShdw blurRad="63500" dist="38099" dir="2700000" algn="ctr" rotWithShape="0">
+                                <a:schemeClr val="bg2">
+                                  <a:alpha val="74998"/>
+                                </a:schemeClr>
+                              </a:outerShdw>
+                            </a:effectLst>
+                          </a14:hiddenEffects>
+                        </a:ext>
+                      </a:extLst>
+                    </p:spPr>
+                  </p:pic>
+                </p:oleObj>
+              </mc:Fallback>
+            </mc:AlternateContent>
+          </a:graphicData>
+        </a:graphic>
+      </p:graphicFrame>
+    </p:spTree>
+    <p:extLst>
+      <p:ext uri="{BB962C8B-B14F-4D97-AF65-F5344CB8AC3E}">
+        <p14:creationId xmlns:p14="http://schemas.microsoft.com/office/powerpoint/2010/main" val="2686350549"/>
+      </p:ext>
+    </p:extLst>
+  </p:cSld>
+  <p:clrMapOvr>
+    <a:masterClrMapping/>
+  </p:clrMapOvr>
+  <mc:AlternateContent xmlns:mc="http://schemas.openxmlformats.org/markup-compatibility/2006">
+    <mc:Choice xmlns:p14="http://schemas.microsoft.com/office/powerpoint/2010/main" Requires="p14">
+      <p:transition spd="slow" p14:dur="2000"/>
+    </mc:Choice>
+    <mc:Fallback>
+      <p:transition xmlns:p14="http://schemas.microsoft.com/office/powerpoint/2010/main" spd="slow"/>
+    </mc:Fallback>
+  </mc:AlternateContent>
 </p:sld>
 </file>
 
@@ -11748,7 +13710,7 @@
           <a:graphicData uri="http://schemas.openxmlformats.org/presentationml/2006/ole">
             <mc:AlternateContent xmlns:mc="http://schemas.openxmlformats.org/markup-compatibility/2006">
               <mc:Choice xmlns:v="urn:schemas-microsoft-com:vml" Requires="v">
-                <p:oleObj spid="_x0000_s3112" name="Equation" r:id="rId3" imgW="647640" imgH="368280" progId="Equation.DSMT4">
+                <p:oleObj spid="_x0000_s3125" name="Equation" r:id="rId3" imgW="647640" imgH="368280" progId="Equation.DSMT4">
                   <p:embed/>
                 </p:oleObj>
               </mc:Choice>
@@ -11849,7 +13811,7 @@
           <a:graphicData uri="http://schemas.openxmlformats.org/presentationml/2006/ole">
             <mc:AlternateContent xmlns:mc="http://schemas.openxmlformats.org/markup-compatibility/2006">
               <mc:Choice xmlns:v="urn:schemas-microsoft-com:vml" Requires="v">
-                <p:oleObj spid="_x0000_s3113" name="Equation" r:id="rId5" imgW="647640" imgH="368280" progId="Equation.3">
+                <p:oleObj spid="_x0000_s3126" name="Equation" r:id="rId5" imgW="647640" imgH="368280" progId="Equation.3">
                   <p:embed/>
                 </p:oleObj>
               </mc:Choice>
@@ -12212,7 +14174,7 @@
           <a:graphicData uri="http://schemas.openxmlformats.org/presentationml/2006/ole">
             <mc:AlternateContent xmlns:mc="http://schemas.openxmlformats.org/markup-compatibility/2006">
               <mc:Choice xmlns:v="urn:schemas-microsoft-com:vml" Requires="v">
-                <p:oleObj spid="_x0000_s5167" name="Equation" r:id="rId3" imgW="838080" imgH="507960" progId="Equation.3">
+                <p:oleObj spid="_x0000_s5174" name="Equation" r:id="rId3" imgW="838080" imgH="507960" progId="Equation.3">
                   <p:embed/>
                 </p:oleObj>
               </mc:Choice>
@@ -12374,7 +14336,7 @@
           <a:graphicData uri="http://schemas.openxmlformats.org/presentationml/2006/ole">
             <mc:AlternateContent xmlns:mc="http://schemas.openxmlformats.org/markup-compatibility/2006">
               <mc:Choice xmlns:v="urn:schemas-microsoft-com:vml" Requires="v">
-                <p:oleObj spid="_x0000_s6182" name="Equation" r:id="rId3" imgW="2590560" imgH="533160" progId="Equation.DSMT4">
+                <p:oleObj spid="_x0000_s6195" name="Equation" r:id="rId3" imgW="2590560" imgH="533160" progId="Equation.DSMT4">
                   <p:embed/>
                 </p:oleObj>
               </mc:Choice>
@@ -12469,7 +14431,7 @@
           <a:graphicData uri="http://schemas.openxmlformats.org/presentationml/2006/ole">
             <mc:AlternateContent xmlns:mc="http://schemas.openxmlformats.org/markup-compatibility/2006">
               <mc:Choice xmlns:v="urn:schemas-microsoft-com:vml" Requires="v">
-                <p:oleObj spid="_x0000_s6183" name="Equation" r:id="rId5" imgW="3797280" imgH="1307880" progId="Equation.3">
+                <p:oleObj spid="_x0000_s6196" name="Equation" r:id="rId5" imgW="3797280" imgH="1307880" progId="Equation.3">
                   <p:embed/>
                 </p:oleObj>
               </mc:Choice>
@@ -12659,7 +14621,7 @@
           <a:graphicData uri="http://schemas.openxmlformats.org/presentationml/2006/ole">
             <mc:AlternateContent xmlns:mc="http://schemas.openxmlformats.org/markup-compatibility/2006">
               <mc:Choice xmlns:v="urn:schemas-microsoft-com:vml" Requires="v">
-                <p:oleObj spid="_x0000_s7189" name="Equation" r:id="rId3" imgW="6070600" imgH="2501900" progId="Equation.3">
+                <p:oleObj spid="_x0000_s7196" name="Equation" r:id="rId3" imgW="6070600" imgH="2501900" progId="Equation.3">
                   <p:embed/>
                 </p:oleObj>
               </mc:Choice>

</xml_diff>